<commit_message>
Presentation PPT initial version
</commit_message>
<xml_diff>
--- a/doc/Group_K_Project_3.pptx
+++ b/doc/Group_K_Project_3.pptx
@@ -5,28 +5,33 @@
     <p:sldMasterId id="2147483891" r:id="rId1"/>
   </p:sldMasterIdLst>
   <p:notesMasterIdLst>
-    <p:notesMasterId r:id="rId8"/>
+    <p:notesMasterId r:id="rId13"/>
   </p:notesMasterIdLst>
   <p:handoutMasterIdLst>
-    <p:handoutMasterId r:id="rId9"/>
+    <p:handoutMasterId r:id="rId14"/>
   </p:handoutMasterIdLst>
   <p:sldIdLst>
     <p:sldId id="256" r:id="rId2"/>
     <p:sldId id="294" r:id="rId3"/>
     <p:sldId id="295" r:id="rId4"/>
-    <p:sldId id="298" r:id="rId5"/>
-    <p:sldId id="296" r:id="rId6"/>
-    <p:sldId id="297" r:id="rId7"/>
+    <p:sldId id="299" r:id="rId5"/>
+    <p:sldId id="300" r:id="rId6"/>
+    <p:sldId id="296" r:id="rId7"/>
+    <p:sldId id="301" r:id="rId8"/>
+    <p:sldId id="302" r:id="rId9"/>
+    <p:sldId id="297" r:id="rId10"/>
+    <p:sldId id="303" r:id="rId11"/>
+    <p:sldId id="304" r:id="rId12"/>
   </p:sldIdLst>
   <p:sldSz cx="12192000" cy="6858000"/>
   <p:notesSz cx="6858000" cy="9144000"/>
   <p:embeddedFontLst>
     <p:embeddedFont>
       <p:font typeface="Open Sans" panose="020B0606030504020204" pitchFamily="34" charset="0"/>
-      <p:regular r:id="rId10"/>
-      <p:bold r:id="rId11"/>
-      <p:italic r:id="rId12"/>
-      <p:boldItalic r:id="rId13"/>
+      <p:regular r:id="rId15"/>
+      <p:bold r:id="rId16"/>
+      <p:italic r:id="rId17"/>
+      <p:boldItalic r:id="rId18"/>
     </p:embeddedFont>
   </p:embeddedFontLst>
   <p:defaultTextStyle>
@@ -226,7 +231,7 @@
           <a:p>
             <a:fld id="{C6AC6211-610F-44E5-BF19-D3CDF6EDD281}" type="datetimeFigureOut">
               <a:rPr lang="de-DE" smtClean="0"/>
-              <a:t>03.02.2025</a:t>
+              <a:t>05.02.2025</a:t>
             </a:fld>
             <a:endParaRPr lang="de-DE"/>
           </a:p>
@@ -392,7 +397,7 @@
           <a:p>
             <a:fld id="{347435D3-23A6-45D3-8DFA-7317DC1E7A64}" type="datetimeFigureOut">
               <a:rPr lang="de-DE" smtClean="0"/>
-              <a:t>03.02.2025</a:t>
+              <a:t>05.02.2025</a:t>
             </a:fld>
             <a:endParaRPr lang="de-DE"/>
           </a:p>
@@ -11943,7 +11948,7 @@
         </p:nvSpPr>
         <p:spPr>
           <a:xfrm>
-            <a:off x="882808" y="2852116"/>
+            <a:off x="705526" y="1835079"/>
             <a:ext cx="3124060" cy="246221"/>
           </a:xfrm>
         </p:spPr>
@@ -11970,7 +11975,7 @@
         </p:nvSpPr>
         <p:spPr>
           <a:xfrm>
-            <a:off x="882771" y="3835706"/>
+            <a:off x="705526" y="2604458"/>
             <a:ext cx="10693248" cy="984885"/>
           </a:xfrm>
         </p:spPr>
@@ -12004,8 +12009,8 @@
         </p:nvSpPr>
         <p:spPr>
           <a:xfrm>
-            <a:off x="882772" y="5028236"/>
-            <a:ext cx="4281621" cy="1708160"/>
+            <a:off x="7045723" y="3719541"/>
+            <a:ext cx="4579780" cy="2677656"/>
           </a:xfrm>
         </p:spPr>
         <p:txBody>
@@ -12013,60 +12018,76 @@
           <a:lstStyle/>
           <a:p>
             <a:r>
-              <a:rPr lang="en-US" dirty="0"/>
-              <a:t>Group:    K</a:t>
-            </a:r>
+              <a:rPr lang="en-US" b="1" dirty="0"/>
+              <a:t>Group     : K</a:t>
+            </a:r>
+          </a:p>
+          <a:p>
+            <a:br>
+              <a:rPr lang="en-US" b="1" dirty="0"/>
+            </a:br>
+            <a:r>
+              <a:rPr lang="en-US" b="1" dirty="0"/>
+              <a:t>Students: </a:t>
+            </a:r>
+            <a:r>
+              <a:rPr lang="en-US" b="1" dirty="0" err="1"/>
+              <a:t>Bibin</a:t>
+            </a:r>
+            <a:r>
+              <a:rPr lang="en-US" b="1" dirty="0"/>
+              <a:t> Biju Joshua</a:t>
+            </a:r>
+          </a:p>
+          <a:p>
+            <a:r>
+              <a:rPr lang="en-US" b="1" dirty="0"/>
+              <a:t>	  Dhanush Harish Shetty</a:t>
+            </a:r>
+          </a:p>
+          <a:p>
+            <a:r>
+              <a:rPr lang="en-US" b="1" dirty="0"/>
+              <a:t>	  Nagaraj Venkatesh Reddy</a:t>
+            </a:r>
+          </a:p>
+          <a:p>
+            <a:r>
+              <a:rPr lang="en-US" b="1" dirty="0"/>
+              <a:t>	  Raghuveer </a:t>
+            </a:r>
+            <a:r>
+              <a:rPr lang="en-US" b="1" dirty="0" err="1"/>
+              <a:t>Pundaliksa</a:t>
+            </a:r>
+            <a:r>
+              <a:rPr lang="en-US" b="1" dirty="0"/>
+              <a:t> </a:t>
+            </a:r>
+            <a:r>
+              <a:rPr lang="en-US" b="1" dirty="0" err="1"/>
+              <a:t>Meharwade</a:t>
+            </a:r>
+            <a:endParaRPr lang="en-US" b="1" dirty="0"/>
+          </a:p>
+          <a:p>
+            <a:endParaRPr lang="en-US" b="1" dirty="0"/>
+          </a:p>
+          <a:p>
             <a:br>
               <a:rPr lang="en-US" dirty="0"/>
             </a:br>
             <a:r>
+              <a:rPr lang="en-US" b="1" dirty="0"/>
+              <a:t>Day of presentation</a:t>
+            </a:r>
+            <a:r>
               <a:rPr lang="en-US" dirty="0"/>
-              <a:t>Students: </a:t>
-            </a:r>
-            <a:r>
-              <a:rPr lang="en-US" dirty="0" err="1"/>
-              <a:t>Bibin</a:t>
-            </a:r>
-            <a:r>
-              <a:rPr lang="en-US" dirty="0"/>
-              <a:t> Biju Joshua</a:t>
-            </a:r>
-          </a:p>
-          <a:p>
-            <a:r>
-              <a:rPr lang="en-US" dirty="0"/>
-              <a:t>	 Dhanush Harish Shetty</a:t>
-            </a:r>
-          </a:p>
-          <a:p>
-            <a:r>
-              <a:rPr lang="en-US" dirty="0"/>
-              <a:t>	 Nagaraj Venkatesh Reddy</a:t>
-            </a:r>
-          </a:p>
-          <a:p>
-            <a:r>
-              <a:rPr lang="en-US" dirty="0"/>
-              <a:t>	 Raghuveer </a:t>
-            </a:r>
-            <a:r>
-              <a:rPr lang="en-US" dirty="0" err="1"/>
-              <a:t>Pundaliksa</a:t>
-            </a:r>
-            <a:r>
-              <a:rPr lang="en-US" dirty="0"/>
-              <a:t> </a:t>
-            </a:r>
-            <a:r>
-              <a:rPr lang="en-US" dirty="0" err="1"/>
-              <a:t>Meharwade</a:t>
-            </a:r>
-            <a:br>
-              <a:rPr lang="en-US" dirty="0"/>
-            </a:br>
-            <a:r>
-              <a:rPr lang="en-US" dirty="0"/>
-              <a:t>Day of presentation: 07/02/2025</a:t>
+              <a:t>: </a:t>
+            </a:r>
+            <a:r>
+              <a:rPr lang="en-US" b="1" dirty="0"/>
+              <a:t>07/02/2025</a:t>
             </a:r>
           </a:p>
         </p:txBody>
@@ -12083,7 +12104,7 @@
         </p:nvSpPr>
         <p:spPr>
           <a:xfrm>
-            <a:off x="882808" y="3138045"/>
+            <a:off x="705526" y="2165834"/>
             <a:ext cx="6340197" cy="246221"/>
           </a:xfrm>
         </p:spPr>
@@ -12110,6 +12131,357 @@
     <p:extLst>
       <p:ext uri="{BB962C8B-B14F-4D97-AF65-F5344CB8AC3E}">
         <p14:creationId xmlns:p14="http://schemas.microsoft.com/office/powerpoint/2010/main" val="868022722"/>
+      </p:ext>
+    </p:extLst>
+  </p:cSld>
+  <p:clrMapOvr>
+    <a:masterClrMapping/>
+  </p:clrMapOvr>
+</p:sld>
+</file>
+
+<file path=ppt/slides/slide10.xml><?xml version="1.0" encoding="utf-8"?>
+<p:sld xmlns:a="http://schemas.openxmlformats.org/drawingml/2006/main" xmlns:r="http://schemas.openxmlformats.org/officeDocument/2006/relationships" xmlns:p="http://schemas.openxmlformats.org/presentationml/2006/main">
+  <p:cSld>
+    <p:spTree>
+      <p:nvGrpSpPr>
+        <p:cNvPr id="1" name="">
+          <a:extLst>
+            <a:ext uri="{FF2B5EF4-FFF2-40B4-BE49-F238E27FC236}">
+              <a16:creationId xmlns:a16="http://schemas.microsoft.com/office/drawing/2014/main" id="{112934A6-FC2E-2D8F-52FE-45AE7B76D9C0}"/>
+            </a:ext>
+          </a:extLst>
+        </p:cNvPr>
+        <p:cNvGrpSpPr/>
+        <p:nvPr/>
+      </p:nvGrpSpPr>
+      <p:grpSpPr>
+        <a:xfrm>
+          <a:off x="0" y="0"/>
+          <a:ext cx="0" cy="0"/>
+          <a:chOff x="0" y="0"/>
+          <a:chExt cx="0" cy="0"/>
+        </a:xfrm>
+      </p:grpSpPr>
+      <p:sp>
+        <p:nvSpPr>
+          <p:cNvPr id="3" name="Titel 2">
+            <a:extLst>
+              <a:ext uri="{FF2B5EF4-FFF2-40B4-BE49-F238E27FC236}">
+                <a16:creationId xmlns:a16="http://schemas.microsoft.com/office/drawing/2014/main" id="{FF7761D0-2E41-F06B-4E61-9A32B0BEE6C5}"/>
+              </a:ext>
+            </a:extLst>
+          </p:cNvPr>
+          <p:cNvSpPr>
+            <a:spLocks noGrp="1"/>
+          </p:cNvSpPr>
+          <p:nvPr>
+            <p:ph type="title"/>
+          </p:nvPr>
+        </p:nvSpPr>
+        <p:spPr/>
+        <p:txBody>
+          <a:bodyPr/>
+          <a:lstStyle/>
+          <a:p>
+            <a:r>
+              <a:rPr lang="en-US" dirty="0"/>
+              <a:t>Summary</a:t>
+            </a:r>
+            <a:br>
+              <a:rPr lang="en-US" dirty="0"/>
+            </a:br>
+            <a:br>
+              <a:rPr lang="en-US" dirty="0"/>
+            </a:br>
+            <a:endParaRPr lang="en-US" b="0" dirty="0"/>
+          </a:p>
+        </p:txBody>
+      </p:sp>
+      <p:sp>
+        <p:nvSpPr>
+          <p:cNvPr id="2" name="Inhaltsplatzhalter 1">
+            <a:extLst>
+              <a:ext uri="{FF2B5EF4-FFF2-40B4-BE49-F238E27FC236}">
+                <a16:creationId xmlns:a16="http://schemas.microsoft.com/office/drawing/2014/main" id="{FA1CA48A-9AD4-DA3D-1604-2721E4AE82D6}"/>
+              </a:ext>
+            </a:extLst>
+          </p:cNvPr>
+          <p:cNvSpPr>
+            <a:spLocks noGrp="1"/>
+          </p:cNvSpPr>
+          <p:nvPr>
+            <p:ph sz="quarter" idx="10"/>
+          </p:nvPr>
+        </p:nvSpPr>
+        <p:spPr/>
+        <p:txBody>
+          <a:bodyPr/>
+          <a:lstStyle/>
+          <a:p>
+            <a:pPr lvl="2" algn="just">
+              <a:lnSpc>
+                <a:spcPct val="150000"/>
+              </a:lnSpc>
+              <a:spcBef>
+                <a:spcPts val="0"/>
+              </a:spcBef>
+            </a:pPr>
+            <a:r>
+              <a:rPr lang="en-US" dirty="0"/>
+              <a:t>Significantly lower the power dissipation of pseudo-memcapacitor can be used to emulate leaky integrate-and-fire neuron with a transistor.</a:t>
+            </a:r>
+          </a:p>
+          <a:p>
+            <a:pPr lvl="2" algn="just">
+              <a:lnSpc>
+                <a:spcPct val="150000"/>
+              </a:lnSpc>
+              <a:spcBef>
+                <a:spcPts val="0"/>
+              </a:spcBef>
+            </a:pPr>
+            <a:r>
+              <a:rPr lang="en-US" dirty="0"/>
+              <a:t>Key considerations are Roff/Ron &gt; 10 and Cgs/Cm &gt; 5</a:t>
+            </a:r>
+          </a:p>
+          <a:p>
+            <a:pPr lvl="2" algn="just">
+              <a:lnSpc>
+                <a:spcPct val="150000"/>
+              </a:lnSpc>
+              <a:spcBef>
+                <a:spcPts val="0"/>
+              </a:spcBef>
+            </a:pPr>
+            <a:r>
+              <a:rPr lang="en-US" dirty="0"/>
+              <a:t>In single neuro-transistor, </a:t>
+            </a:r>
+            <a:r>
+              <a:rPr lang="en-US" dirty="0">
+                <a:latin typeface="+mj-lt"/>
+                <a:ea typeface="+mj-ea"/>
+                <a:cs typeface="+mj-cs"/>
+              </a:rPr>
+              <a:t>a n</a:t>
+            </a:r>
+            <a:r>
+              <a:rPr lang="en-US" sz="1600" dirty="0">
+                <a:solidFill>
+                  <a:schemeClr val="accent1"/>
+                </a:solidFill>
+                <a:latin typeface="+mj-lt"/>
+                <a:ea typeface="+mj-ea"/>
+                <a:cs typeface="+mj-cs"/>
+              </a:rPr>
+              <a:t>ice gap between the On State current value and Off state current value are observed.</a:t>
+            </a:r>
+          </a:p>
+          <a:p>
+            <a:pPr lvl="2" algn="just">
+              <a:lnSpc>
+                <a:spcPct val="150000"/>
+              </a:lnSpc>
+              <a:spcBef>
+                <a:spcPts val="0"/>
+              </a:spcBef>
+            </a:pPr>
+            <a:r>
+              <a:rPr lang="en-US" dirty="0"/>
+              <a:t>In 3x1 neuro-transistor, for TTFS input, observed integration of voltage at the gate of transistor.</a:t>
+            </a:r>
+          </a:p>
+          <a:p>
+            <a:pPr lvl="2" algn="just">
+              <a:lnSpc>
+                <a:spcPct val="150000"/>
+              </a:lnSpc>
+              <a:spcBef>
+                <a:spcPts val="0"/>
+              </a:spcBef>
+            </a:pPr>
+            <a:r>
+              <a:rPr lang="en-US" dirty="0"/>
+              <a:t>In 3x3 neuro-transistor, observed </a:t>
+            </a:r>
+            <a:r>
+              <a:rPr lang="en-US" dirty="0">
+                <a:latin typeface="+mj-lt"/>
+                <a:ea typeface="+mj-ea"/>
+                <a:cs typeface="+mj-cs"/>
+              </a:rPr>
+              <a:t>a</a:t>
+            </a:r>
+            <a:r>
+              <a:rPr lang="en-US" sz="1600" dirty="0">
+                <a:solidFill>
+                  <a:schemeClr val="accent1"/>
+                </a:solidFill>
+                <a:latin typeface="+mj-lt"/>
+                <a:ea typeface="+mj-ea"/>
+                <a:cs typeface="+mj-cs"/>
+              </a:rPr>
+              <a:t>lmost Identical response in </a:t>
+            </a:r>
+            <a:r>
+              <a:rPr lang="en-US" dirty="0">
+                <a:latin typeface="+mj-lt"/>
+                <a:ea typeface="+mj-ea"/>
+                <a:cs typeface="+mj-cs"/>
+              </a:rPr>
+              <a:t>symmetric row, column arrangement </a:t>
+            </a:r>
+            <a:r>
+              <a:rPr lang="en-US" sz="1600" dirty="0">
+                <a:solidFill>
+                  <a:schemeClr val="accent1"/>
+                </a:solidFill>
+                <a:latin typeface="+mj-lt"/>
+                <a:ea typeface="+mj-ea"/>
+                <a:cs typeface="+mj-cs"/>
+              </a:rPr>
+              <a:t>when steady state reached. And a small difference observed at the start.</a:t>
+            </a:r>
+            <a:endParaRPr lang="en-IN" dirty="0"/>
+          </a:p>
+          <a:p>
+            <a:pPr lvl="2" algn="just">
+              <a:lnSpc>
+                <a:spcPct val="150000"/>
+              </a:lnSpc>
+              <a:spcBef>
+                <a:spcPts val="0"/>
+              </a:spcBef>
+            </a:pPr>
+            <a:r>
+              <a:rPr lang="en-US" b="0" dirty="0"/>
+              <a:t>A current to voltage amplifier can be used to </a:t>
+            </a:r>
+            <a:r>
+              <a:rPr lang="en-US" dirty="0"/>
+              <a:t>c</a:t>
+            </a:r>
+            <a:r>
+              <a:rPr lang="en-US" b="0" dirty="0"/>
+              <a:t>ascade neuro-transistor to realize a spiking neural network.</a:t>
+            </a:r>
+            <a:endParaRPr lang="en-US" dirty="0"/>
+          </a:p>
+          <a:p>
+            <a:pPr lvl="2">
+              <a:spcBef>
+                <a:spcPts val="0"/>
+              </a:spcBef>
+            </a:pPr>
+            <a:endParaRPr lang="en-US" dirty="0"/>
+          </a:p>
+          <a:p>
+            <a:pPr lvl="2">
+              <a:spcBef>
+                <a:spcPts val="0"/>
+              </a:spcBef>
+            </a:pPr>
+            <a:endParaRPr lang="en-US" dirty="0"/>
+          </a:p>
+          <a:p>
+            <a:pPr lvl="2">
+              <a:spcBef>
+                <a:spcPts val="0"/>
+              </a:spcBef>
+            </a:pPr>
+            <a:endParaRPr lang="en-US" dirty="0"/>
+          </a:p>
+          <a:p>
+            <a:pPr lvl="2">
+              <a:spcBef>
+                <a:spcPts val="0"/>
+              </a:spcBef>
+            </a:pPr>
+            <a:endParaRPr lang="en-US" dirty="0"/>
+          </a:p>
+          <a:p>
+            <a:pPr lvl="2">
+              <a:spcBef>
+                <a:spcPts val="0"/>
+              </a:spcBef>
+            </a:pPr>
+            <a:endParaRPr lang="en-US" dirty="0"/>
+          </a:p>
+        </p:txBody>
+      </p:sp>
+    </p:spTree>
+    <p:custDataLst>
+      <p:tags r:id="rId1"/>
+    </p:custDataLst>
+    <p:extLst>
+      <p:ext uri="{BB962C8B-B14F-4D97-AF65-F5344CB8AC3E}">
+        <p14:creationId xmlns:p14="http://schemas.microsoft.com/office/powerpoint/2010/main" val="79124595"/>
+      </p:ext>
+    </p:extLst>
+  </p:cSld>
+  <p:clrMapOvr>
+    <a:masterClrMapping/>
+  </p:clrMapOvr>
+</p:sld>
+</file>
+
+<file path=ppt/slides/slide11.xml><?xml version="1.0" encoding="utf-8"?>
+<p:sld xmlns:a="http://schemas.openxmlformats.org/drawingml/2006/main" xmlns:r="http://schemas.openxmlformats.org/officeDocument/2006/relationships" xmlns:p="http://schemas.openxmlformats.org/presentationml/2006/main">
+  <p:cSld>
+    <p:spTree>
+      <p:nvGrpSpPr>
+        <p:cNvPr id="1" name=""/>
+        <p:cNvGrpSpPr/>
+        <p:nvPr/>
+      </p:nvGrpSpPr>
+      <p:grpSpPr>
+        <a:xfrm>
+          <a:off x="0" y="0"/>
+          <a:ext cx="0" cy="0"/>
+          <a:chOff x="0" y="0"/>
+          <a:chExt cx="0" cy="0"/>
+        </a:xfrm>
+      </p:grpSpPr>
+      <p:sp>
+        <p:nvSpPr>
+          <p:cNvPr id="3" name="Title 2">
+            <a:extLst>
+              <a:ext uri="{FF2B5EF4-FFF2-40B4-BE49-F238E27FC236}">
+                <a16:creationId xmlns:a16="http://schemas.microsoft.com/office/drawing/2014/main" id="{0BECCC3C-6163-5D7F-CD80-CA28E2D95E88}"/>
+              </a:ext>
+            </a:extLst>
+          </p:cNvPr>
+          <p:cNvSpPr>
+            <a:spLocks noGrp="1"/>
+          </p:cNvSpPr>
+          <p:nvPr>
+            <p:ph type="title"/>
+          </p:nvPr>
+        </p:nvSpPr>
+        <p:spPr>
+          <a:xfrm>
+            <a:off x="3055744" y="3114778"/>
+            <a:ext cx="6080511" cy="1231106"/>
+          </a:xfrm>
+        </p:spPr>
+        <p:txBody>
+          <a:bodyPr/>
+          <a:lstStyle/>
+          <a:p>
+            <a:r>
+              <a:rPr lang="en-US" sz="8000" dirty="0"/>
+              <a:t>THANK YOU</a:t>
+            </a:r>
+            <a:endParaRPr lang="en-IN" sz="8000" dirty="0"/>
+          </a:p>
+        </p:txBody>
+      </p:sp>
+    </p:spTree>
+    <p:extLst>
+      <p:ext uri="{BB962C8B-B14F-4D97-AF65-F5344CB8AC3E}">
+        <p14:creationId xmlns:p14="http://schemas.microsoft.com/office/powerpoint/2010/main" val="187377327"/>
       </p:ext>
     </p:extLst>
   </p:cSld>
@@ -12146,18 +12518,20 @@
             <p:ph type="title"/>
           </p:nvPr>
         </p:nvSpPr>
-        <p:spPr/>
+        <p:spPr>
+          <a:xfrm>
+            <a:off x="874712" y="346075"/>
+            <a:ext cx="10580687" cy="437695"/>
+          </a:xfrm>
+        </p:spPr>
         <p:txBody>
           <a:bodyPr/>
           <a:lstStyle/>
           <a:p>
             <a:r>
               <a:rPr lang="en-US" dirty="0"/>
-              <a:t>Task, goal and research questions</a:t>
-            </a:r>
-            <a:br>
-              <a:rPr lang="en-US" dirty="0"/>
-            </a:br>
+              <a:t>Introduction</a:t>
+            </a:r>
             <a:endParaRPr lang="en-US" b="0" dirty="0"/>
           </a:p>
         </p:txBody>
@@ -12172,20 +12546,220 @@
             <p:ph sz="quarter" idx="10"/>
           </p:nvPr>
         </p:nvSpPr>
-        <p:spPr/>
+        <p:spPr>
+          <a:xfrm>
+            <a:off x="874711" y="925975"/>
+            <a:ext cx="10580688" cy="4903325"/>
+          </a:xfrm>
+        </p:spPr>
         <p:txBody>
           <a:bodyPr/>
           <a:lstStyle/>
           <a:p>
-            <a:pPr lvl="2">
+            <a:pPr marL="0" lvl="2" indent="0" algn="just">
               <a:spcBef>
                 <a:spcPts val="0"/>
               </a:spcBef>
+              <a:buNone/>
             </a:pPr>
             <a:r>
+              <a:rPr lang="en-US" b="1" dirty="0"/>
+              <a:t>Topic: </a:t>
+            </a:r>
+            <a:r>
               <a:rPr lang="en-US" dirty="0"/>
-              <a:t>…</a:t>
-            </a:r>
+              <a:t>Realization of the neuron functionality with a pseudo-memcapacitive transistor using LTSPICE </a:t>
+            </a:r>
+          </a:p>
+          <a:p>
+            <a:pPr marL="0" lvl="2" indent="0" algn="just">
+              <a:spcBef>
+                <a:spcPts val="0"/>
+              </a:spcBef>
+              <a:buNone/>
+            </a:pPr>
+            <a:endParaRPr lang="en-US" dirty="0"/>
+          </a:p>
+          <a:p>
+            <a:pPr marL="0" lvl="2" indent="0" algn="just">
+              <a:spcBef>
+                <a:spcPts val="0"/>
+              </a:spcBef>
+              <a:buNone/>
+            </a:pPr>
+            <a:r>
+              <a:rPr lang="en-US" dirty="0"/>
+              <a:t>A pseudo-memcapacitive device can be formed by the memristors intrinsic parallel capacitance, and a series capacitor. This can significantly lower the power dissipation of the circuit because the signal is expressed as a voltage rather than a current. </a:t>
+            </a:r>
+          </a:p>
+          <a:p>
+            <a:pPr marL="0" lvl="2" indent="0" algn="just">
+              <a:spcBef>
+                <a:spcPts val="0"/>
+              </a:spcBef>
+              <a:buNone/>
+            </a:pPr>
+            <a:endParaRPr lang="en-US" dirty="0"/>
+          </a:p>
+          <a:p>
+            <a:pPr marL="0" lvl="2" indent="0" algn="just">
+              <a:spcBef>
+                <a:spcPts val="0"/>
+              </a:spcBef>
+              <a:buNone/>
+            </a:pPr>
+            <a:r>
+              <a:rPr lang="en-US" dirty="0"/>
+              <a:t>The pseudo-memcapacitor at the gate of a transistor, can be used in leaky integrate-and-fire neuron emulator. </a:t>
+            </a:r>
+          </a:p>
+          <a:p>
+            <a:pPr marL="0" lvl="2" indent="0" algn="just">
+              <a:spcBef>
+                <a:spcPts val="0"/>
+              </a:spcBef>
+              <a:buNone/>
+            </a:pPr>
+            <a:endParaRPr lang="en-US" dirty="0"/>
+          </a:p>
+          <a:p>
+            <a:pPr marL="0" lvl="2" indent="0" algn="just">
+              <a:spcBef>
+                <a:spcPts val="0"/>
+              </a:spcBef>
+              <a:buNone/>
+            </a:pPr>
+            <a:r>
+              <a:rPr lang="en-US" dirty="0"/>
+              <a:t> </a:t>
+            </a:r>
+          </a:p>
+        </p:txBody>
+      </p:sp>
+      <p:pic>
+        <p:nvPicPr>
+          <p:cNvPr id="5" name="Picture 4">
+            <a:extLst>
+              <a:ext uri="{FF2B5EF4-FFF2-40B4-BE49-F238E27FC236}">
+                <a16:creationId xmlns:a16="http://schemas.microsoft.com/office/drawing/2014/main" id="{16AC56F3-EDA7-C29D-5602-FD1556F683A9}"/>
+              </a:ext>
+            </a:extLst>
+          </p:cNvPr>
+          <p:cNvPicPr>
+            <a:picLocks noChangeAspect="1"/>
+          </p:cNvPicPr>
+          <p:nvPr/>
+        </p:nvPicPr>
+        <p:blipFill>
+          <a:blip r:embed="rId3"/>
+          <a:stretch>
+            <a:fillRect/>
+          </a:stretch>
+        </p:blipFill>
+        <p:spPr>
+          <a:xfrm>
+            <a:off x="3719037" y="2647322"/>
+            <a:ext cx="5222799" cy="2772322"/>
+          </a:xfrm>
+          <a:prstGeom prst="rect">
+            <a:avLst/>
+          </a:prstGeom>
+        </p:spPr>
+      </p:pic>
+      <p:sp>
+        <p:nvSpPr>
+          <p:cNvPr id="6" name="TextBox 5">
+            <a:extLst>
+              <a:ext uri="{FF2B5EF4-FFF2-40B4-BE49-F238E27FC236}">
+                <a16:creationId xmlns:a16="http://schemas.microsoft.com/office/drawing/2014/main" id="{3A7113EE-0626-BFE4-892B-BA17E4206E88}"/>
+              </a:ext>
+            </a:extLst>
+          </p:cNvPr>
+          <p:cNvSpPr txBox="1"/>
+          <p:nvPr/>
+        </p:nvSpPr>
+        <p:spPr>
+          <a:xfrm>
+            <a:off x="805656" y="5490746"/>
+            <a:ext cx="10580687" cy="338554"/>
+          </a:xfrm>
+          <a:prstGeom prst="rect">
+            <a:avLst/>
+          </a:prstGeom>
+          <a:noFill/>
+        </p:spPr>
+        <p:txBody>
+          <a:bodyPr wrap="square" rtlCol="0">
+            <a:spAutoFit/>
+          </a:bodyPr>
+          <a:lstStyle/>
+          <a:p>
+            <a:pPr algn="just"/>
+            <a:r>
+              <a:rPr lang="en-IN" sz="800" dirty="0"/>
+              <a:t>R. </a:t>
+            </a:r>
+            <a:r>
+              <a:rPr lang="en-IN" sz="800" dirty="0" err="1"/>
+              <a:t>Schroedter</a:t>
+            </a:r>
+            <a:r>
+              <a:rPr lang="en-IN" sz="800" dirty="0"/>
+              <a:t>, A. S. </a:t>
+            </a:r>
+            <a:r>
+              <a:rPr lang="en-IN" sz="800" dirty="0" err="1"/>
+              <a:t>Demirkol</a:t>
+            </a:r>
+            <a:r>
+              <a:rPr lang="en-IN" sz="800" dirty="0"/>
+              <a:t>, A. Ascoli, B. Max, F. </a:t>
+            </a:r>
+            <a:r>
+              <a:rPr lang="en-IN" sz="800" dirty="0" err="1"/>
+              <a:t>Nebe</a:t>
+            </a:r>
+            <a:r>
+              <a:rPr lang="en-IN" sz="800" dirty="0"/>
+              <a:t>, T. </a:t>
+            </a:r>
+            <a:r>
+              <a:rPr lang="en-IN" sz="800" dirty="0" err="1"/>
+              <a:t>Mikolajick</a:t>
+            </a:r>
+            <a:r>
+              <a:rPr lang="en-IN" sz="800" dirty="0"/>
+              <a:t>,  R. Tetzlaff, "</a:t>
+            </a:r>
+            <a:r>
+              <a:rPr lang="en-IN" sz="800" dirty="0">
+                <a:hlinkClick r:id="rId4"/>
+              </a:rPr>
+              <a:t>A pseudo-memcapacitive </a:t>
+            </a:r>
+            <a:r>
+              <a:rPr lang="en-IN" sz="800" dirty="0" err="1">
+                <a:hlinkClick r:id="rId4"/>
+              </a:rPr>
+              <a:t>neurotransistor</a:t>
+            </a:r>
+            <a:r>
+              <a:rPr lang="en-IN" sz="800" dirty="0">
+                <a:hlinkClick r:id="rId4"/>
+              </a:rPr>
+              <a:t> for spiking neural networks</a:t>
+            </a:r>
+            <a:r>
+              <a:rPr lang="en-IN" sz="800" dirty="0"/>
+              <a:t>", 12th International Conference on Modern Circuits and Systems Technologies (MOCAST) on Electronics and Communications, Athens, Greece, pp. 1-4, 2023, DOI: </a:t>
+            </a:r>
+            <a:r>
+              <a:rPr lang="en-IN" sz="800" dirty="0">
+                <a:hlinkClick r:id="rId4"/>
+              </a:rPr>
+              <a:t>10.1109/MOCAST57943.2023.10176398</a:t>
+            </a:r>
+            <a:endParaRPr lang="en-IN" sz="800" dirty="0"/>
           </a:p>
         </p:txBody>
       </p:sp>
@@ -12258,23 +12832,314 @@
             <p:ph sz="quarter" idx="10"/>
           </p:nvPr>
         </p:nvSpPr>
-        <p:spPr/>
+        <p:spPr>
+          <a:xfrm>
+            <a:off x="874711" y="922021"/>
+            <a:ext cx="10580688" cy="4907280"/>
+          </a:xfrm>
+        </p:spPr>
         <p:txBody>
           <a:bodyPr/>
           <a:lstStyle/>
           <a:p>
-            <a:pPr lvl="2">
+            <a:pPr marL="342900" lvl="2" indent="-342900" algn="just">
               <a:spcBef>
                 <a:spcPts val="0"/>
               </a:spcBef>
+              <a:buAutoNum type="arabicPeriod"/>
             </a:pPr>
             <a:r>
               <a:rPr lang="en-US" dirty="0"/>
-              <a:t>…</a:t>
-            </a:r>
-          </a:p>
-        </p:txBody>
-      </p:sp>
+              <a:t>Find a pulse input setting which realizes the neuron firing after integration through the transistor </a:t>
+            </a:r>
+            <a:r>
+              <a:rPr lang="en-IN" dirty="0"/>
+              <a:t>depending on memristor states in neuro-transistor</a:t>
+            </a:r>
+            <a:r>
+              <a:rPr lang="en-US" dirty="0"/>
+              <a:t>. </a:t>
+            </a:r>
+          </a:p>
+          <a:p>
+            <a:pPr marL="342900" lvl="2" indent="-342900" algn="just">
+              <a:spcBef>
+                <a:spcPts val="0"/>
+              </a:spcBef>
+              <a:buAutoNum type="arabicPeriod"/>
+            </a:pPr>
+            <a:r>
+              <a:rPr lang="en-US" dirty="0"/>
+              <a:t>Discuss the neuro-transistor in cascade to form a spiking neural network.</a:t>
+            </a:r>
+          </a:p>
+          <a:p>
+            <a:pPr marL="0" lvl="2" indent="0">
+              <a:spcBef>
+                <a:spcPts val="0"/>
+              </a:spcBef>
+              <a:buNone/>
+            </a:pPr>
+            <a:endParaRPr lang="en-US" dirty="0"/>
+          </a:p>
+          <a:p>
+            <a:pPr marL="0" lvl="2" indent="0">
+              <a:spcBef>
+                <a:spcPts val="0"/>
+              </a:spcBef>
+              <a:buNone/>
+            </a:pPr>
+            <a:endParaRPr lang="en-US" dirty="0"/>
+          </a:p>
+          <a:p>
+            <a:pPr marL="0" lvl="2" indent="0">
+              <a:spcBef>
+                <a:spcPts val="0"/>
+              </a:spcBef>
+              <a:buNone/>
+            </a:pPr>
+            <a:endParaRPr lang="en-US" dirty="0"/>
+          </a:p>
+        </p:txBody>
+      </p:sp>
+      <p:sp>
+        <p:nvSpPr>
+          <p:cNvPr id="9" name="TextBox 8">
+            <a:extLst>
+              <a:ext uri="{FF2B5EF4-FFF2-40B4-BE49-F238E27FC236}">
+                <a16:creationId xmlns:a16="http://schemas.microsoft.com/office/drawing/2014/main" id="{370ED483-1AEB-A68A-5049-FC5AAFFFB36D}"/>
+              </a:ext>
+            </a:extLst>
+          </p:cNvPr>
+          <p:cNvSpPr txBox="1"/>
+          <p:nvPr/>
+        </p:nvSpPr>
+        <p:spPr>
+          <a:xfrm>
+            <a:off x="874712" y="4790957"/>
+            <a:ext cx="4015340" cy="992579"/>
+          </a:xfrm>
+          <a:prstGeom prst="rect">
+            <a:avLst/>
+          </a:prstGeom>
+          <a:noFill/>
+        </p:spPr>
+        <p:txBody>
+          <a:bodyPr wrap="square" rtlCol="0">
+            <a:spAutoFit/>
+          </a:bodyPr>
+          <a:lstStyle/>
+          <a:p>
+            <a:pPr algn="just"/>
+            <a:r>
+              <a:rPr lang="en-IN" sz="1050" b="1" dirty="0">
+                <a:solidFill>
+                  <a:schemeClr val="accent1"/>
+                </a:solidFill>
+                <a:latin typeface="+mj-lt"/>
+                <a:ea typeface="+mj-ea"/>
+                <a:cs typeface="+mj-cs"/>
+              </a:rPr>
+              <a:t>Memristor</a:t>
+            </a:r>
+            <a:r>
+              <a:rPr lang="en-IN" sz="1050" b="1" dirty="0"/>
+              <a:t> </a:t>
+            </a:r>
+            <a:r>
+              <a:rPr lang="en-IN" sz="1050" b="1" dirty="0">
+                <a:solidFill>
+                  <a:schemeClr val="accent1"/>
+                </a:solidFill>
+                <a:latin typeface="+mj-lt"/>
+                <a:ea typeface="+mj-ea"/>
+                <a:cs typeface="+mj-cs"/>
+              </a:rPr>
+              <a:t>Model</a:t>
+            </a:r>
+          </a:p>
+          <a:p>
+            <a:pPr algn="just"/>
+            <a:r>
+              <a:rPr lang="en-IN" sz="800" dirty="0"/>
+              <a:t>R. </a:t>
+            </a:r>
+            <a:r>
+              <a:rPr lang="en-IN" sz="800" dirty="0" err="1"/>
+              <a:t>Schroedter</a:t>
+            </a:r>
+            <a:r>
+              <a:rPr lang="en-IN" sz="800" dirty="0"/>
+              <a:t>, A. S. </a:t>
+            </a:r>
+            <a:r>
+              <a:rPr lang="en-IN" sz="800" dirty="0" err="1"/>
+              <a:t>Demirkol</a:t>
+            </a:r>
+            <a:r>
+              <a:rPr lang="en-IN" sz="800" dirty="0"/>
+              <a:t>, A. Ascoli, R. Tetzlaff, E. </a:t>
+            </a:r>
+            <a:r>
+              <a:rPr lang="en-IN" sz="800" dirty="0" err="1"/>
+              <a:t>Mgeladze</a:t>
+            </a:r>
+            <a:r>
+              <a:rPr lang="en-IN" sz="800" dirty="0"/>
+              <a:t>, M. Herzig, S. </a:t>
+            </a:r>
+            <a:r>
+              <a:rPr lang="en-IN" sz="800" dirty="0" err="1"/>
+              <a:t>Slesazeck</a:t>
+            </a:r>
+            <a:r>
+              <a:rPr lang="en-IN" sz="800" dirty="0"/>
+              <a:t>, T. </a:t>
+            </a:r>
+            <a:r>
+              <a:rPr lang="en-IN" sz="800" dirty="0" err="1"/>
+              <a:t>Mikolajick</a:t>
+            </a:r>
+            <a:r>
+              <a:rPr lang="en-IN" sz="800" dirty="0"/>
+              <a:t>, "</a:t>
+            </a:r>
+            <a:r>
+              <a:rPr lang="en-IN" sz="800" dirty="0">
+                <a:hlinkClick r:id="rId3"/>
+              </a:rPr>
+              <a:t>SPICE Compact Model for an Analog Switching Niobium Oxide Memristor</a:t>
+            </a:r>
+            <a:r>
+              <a:rPr lang="en-IN" sz="800" dirty="0"/>
+              <a:t>", International Conference on Modern Circuits and Systems Technologies (MOCAST) on Electronics and Communications, Bremen, 2022</a:t>
+            </a:r>
+            <a:br>
+              <a:rPr lang="en-IN" sz="800" dirty="0"/>
+            </a:br>
+            <a:r>
+              <a:rPr lang="en-IN" sz="800" dirty="0"/>
+              <a:t>DOI: </a:t>
+            </a:r>
+            <a:r>
+              <a:rPr lang="en-IN" sz="800" dirty="0">
+                <a:hlinkClick r:id="rId4"/>
+              </a:rPr>
+              <a:t>10.1109/MOCAST54814.2022.9837726</a:t>
+            </a:r>
+            <a:endParaRPr lang="en-IN" sz="800" dirty="0"/>
+          </a:p>
+          <a:p>
+            <a:endParaRPr lang="en-IN" sz="800" dirty="0"/>
+          </a:p>
+        </p:txBody>
+      </p:sp>
+      <p:pic>
+        <p:nvPicPr>
+          <p:cNvPr id="5" name="Picture 4">
+            <a:extLst>
+              <a:ext uri="{FF2B5EF4-FFF2-40B4-BE49-F238E27FC236}">
+                <a16:creationId xmlns:a16="http://schemas.microsoft.com/office/drawing/2014/main" id="{A86862C6-BEA8-F102-316F-9E40EE4615B6}"/>
+              </a:ext>
+            </a:extLst>
+          </p:cNvPr>
+          <p:cNvPicPr>
+            <a:picLocks noChangeAspect="1"/>
+          </p:cNvPicPr>
+          <p:nvPr/>
+        </p:nvPicPr>
+        <p:blipFill>
+          <a:blip r:embed="rId5"/>
+          <a:stretch>
+            <a:fillRect/>
+          </a:stretch>
+        </p:blipFill>
+        <p:spPr>
+          <a:xfrm>
+            <a:off x="874712" y="1651999"/>
+            <a:ext cx="3164793" cy="3138958"/>
+          </a:xfrm>
+          <a:prstGeom prst="rect">
+            <a:avLst/>
+          </a:prstGeom>
+        </p:spPr>
+      </p:pic>
+      <p:sp>
+        <p:nvSpPr>
+          <p:cNvPr id="12" name="Arrow: Right 11">
+            <a:extLst>
+              <a:ext uri="{FF2B5EF4-FFF2-40B4-BE49-F238E27FC236}">
+                <a16:creationId xmlns:a16="http://schemas.microsoft.com/office/drawing/2014/main" id="{E1632924-3643-70ED-F231-F09FD34B1383}"/>
+              </a:ext>
+            </a:extLst>
+          </p:cNvPr>
+          <p:cNvSpPr/>
+          <p:nvPr/>
+        </p:nvSpPr>
+        <p:spPr>
+          <a:xfrm>
+            <a:off x="4419135" y="3142352"/>
+            <a:ext cx="620005" cy="554303"/>
+          </a:xfrm>
+          <a:prstGeom prst="rightArrow">
+            <a:avLst/>
+          </a:prstGeom>
+        </p:spPr>
+        <p:style>
+          <a:lnRef idx="2">
+            <a:schemeClr val="accent1">
+              <a:shade val="15000"/>
+            </a:schemeClr>
+          </a:lnRef>
+          <a:fillRef idx="1">
+            <a:schemeClr val="accent1"/>
+          </a:fillRef>
+          <a:effectRef idx="0">
+            <a:schemeClr val="accent1"/>
+          </a:effectRef>
+          <a:fontRef idx="minor">
+            <a:schemeClr val="lt1"/>
+          </a:fontRef>
+        </p:style>
+        <p:txBody>
+          <a:bodyPr rtlCol="0" anchor="ctr"/>
+          <a:lstStyle/>
+          <a:p>
+            <a:pPr algn="ctr"/>
+            <a:endParaRPr lang="en-IN"/>
+          </a:p>
+        </p:txBody>
+      </p:sp>
+      <p:pic>
+        <p:nvPicPr>
+          <p:cNvPr id="18" name="Picture 17">
+            <a:extLst>
+              <a:ext uri="{FF2B5EF4-FFF2-40B4-BE49-F238E27FC236}">
+                <a16:creationId xmlns:a16="http://schemas.microsoft.com/office/drawing/2014/main" id="{349971AC-CFE9-5D1E-9E7D-D281BD7C1A4E}"/>
+              </a:ext>
+            </a:extLst>
+          </p:cNvPr>
+          <p:cNvPicPr>
+            <a:picLocks noChangeAspect="1"/>
+          </p:cNvPicPr>
+          <p:nvPr/>
+        </p:nvPicPr>
+        <p:blipFill>
+          <a:blip r:embed="rId6"/>
+          <a:stretch>
+            <a:fillRect/>
+          </a:stretch>
+        </p:blipFill>
+        <p:spPr>
+          <a:xfrm>
+            <a:off x="5418772" y="1771387"/>
+            <a:ext cx="6036627" cy="4012149"/>
+          </a:xfrm>
+          <a:prstGeom prst="rect">
+            <a:avLst/>
+          </a:prstGeom>
+        </p:spPr>
+      </p:pic>
     </p:spTree>
     <p:custDataLst>
       <p:tags r:id="rId1"/>
@@ -12296,7 +13161,13 @@
   <p:cSld>
     <p:spTree>
       <p:nvGrpSpPr>
-        <p:cNvPr id="1" name=""/>
+        <p:cNvPr id="1" name="">
+          <a:extLst>
+            <a:ext uri="{FF2B5EF4-FFF2-40B4-BE49-F238E27FC236}">
+              <a16:creationId xmlns:a16="http://schemas.microsoft.com/office/drawing/2014/main" id="{8F9B1A69-B36F-29CC-FAEB-FF5E8158919C}"/>
+            </a:ext>
+          </a:extLst>
+        </p:cNvPr>
         <p:cNvGrpSpPr/>
         <p:nvPr/>
       </p:nvGrpSpPr>
@@ -12310,7 +13181,13 @@
       </p:grpSpPr>
       <p:sp>
         <p:nvSpPr>
-          <p:cNvPr id="3" name="Titel 2"/>
+          <p:cNvPr id="3" name="Titel 2">
+            <a:extLst>
+              <a:ext uri="{FF2B5EF4-FFF2-40B4-BE49-F238E27FC236}">
+                <a16:creationId xmlns:a16="http://schemas.microsoft.com/office/drawing/2014/main" id="{23FC96D5-BA3A-ED95-94BF-99A897E52815}"/>
+              </a:ext>
+            </a:extLst>
+          </p:cNvPr>
           <p:cNvSpPr>
             <a:spLocks noGrp="1"/>
           </p:cNvSpPr>
@@ -12324,9 +13201,12 @@
           <a:lstStyle/>
           <a:p>
             <a:r>
-              <a:rPr lang="en-US" dirty="0"/>
-              <a:t>Methods</a:t>
-            </a:r>
+              <a:rPr lang="en-US" b="1" dirty="0"/>
+              <a:t>Considerations and calculations:</a:t>
+            </a:r>
+            <a:br>
+              <a:rPr lang="en-US" b="1" dirty="0"/>
+            </a:br>
             <a:br>
               <a:rPr lang="en-US" dirty="0"/>
             </a:br>
@@ -12336,27 +13216,685 @@
       </p:sp>
       <p:sp>
         <p:nvSpPr>
-          <p:cNvPr id="2" name="Inhaltsplatzhalter 1"/>
-          <p:cNvSpPr>
-            <a:spLocks noGrp="1"/>
-          </p:cNvSpPr>
-          <p:nvPr>
-            <p:ph sz="quarter" idx="10"/>
-          </p:nvPr>
-        </p:nvSpPr>
-        <p:spPr/>
+          <p:cNvPr id="2" name="Inhaltsplatzhalter 1">
+            <a:extLst>
+              <a:ext uri="{FF2B5EF4-FFF2-40B4-BE49-F238E27FC236}">
+                <a16:creationId xmlns:a16="http://schemas.microsoft.com/office/drawing/2014/main" id="{6B126538-414A-70CA-173A-E587396C061C}"/>
+              </a:ext>
+            </a:extLst>
+          </p:cNvPr>
+          <p:cNvSpPr>
+            <a:spLocks noGrp="1"/>
+          </p:cNvSpPr>
+          <p:nvPr>
+            <p:ph sz="quarter" idx="13"/>
+          </p:nvPr>
+        </p:nvSpPr>
+        <p:spPr>
+          <a:xfrm>
+            <a:off x="874713" y="925975"/>
+            <a:ext cx="3398837" cy="4916025"/>
+          </a:xfrm>
+        </p:spPr>
         <p:txBody>
           <a:bodyPr/>
           <a:lstStyle/>
           <a:p>
-            <a:pPr lvl="2">
+            <a:pPr marL="342900" lvl="2" indent="-342900">
               <a:spcBef>
                 <a:spcPts val="0"/>
               </a:spcBef>
+              <a:buAutoNum type="arabicPeriod"/>
             </a:pPr>
             <a:r>
+              <a:rPr lang="el-GR" dirty="0"/>
+              <a:t>τ</a:t>
+            </a:r>
+            <a:r>
+              <a:rPr lang="en-IN" dirty="0"/>
+              <a:t>on = Ron(Cm + Cgs)</a:t>
+            </a:r>
+          </a:p>
+          <a:p>
+            <a:pPr marL="342900" lvl="2" indent="-342900">
+              <a:buFont typeface="Arial" panose="020B0604020202020204" pitchFamily="34" charset="0"/>
+              <a:buAutoNum type="arabicPeriod"/>
+            </a:pPr>
+            <a:r>
+              <a:rPr lang="el-GR" dirty="0"/>
+              <a:t>τ</a:t>
+            </a:r>
+            <a:r>
+              <a:rPr lang="en-IN" dirty="0"/>
+              <a:t>off = Roff(Cm + Cgs)</a:t>
+            </a:r>
+          </a:p>
+          <a:p>
+            <a:pPr marL="342900" lvl="2" indent="-342900">
+              <a:buFont typeface="Arial" panose="020B0604020202020204" pitchFamily="34" charset="0"/>
+              <a:buAutoNum type="arabicPeriod"/>
+            </a:pPr>
+            <a:r>
+              <a:rPr lang="en-IN" dirty="0"/>
+              <a:t>Roff/Ron &gt; 10</a:t>
+            </a:r>
+          </a:p>
+          <a:p>
+            <a:pPr marL="342900" lvl="2" indent="-342900">
+              <a:buFont typeface="Arial" panose="020B0604020202020204" pitchFamily="34" charset="0"/>
+              <a:buAutoNum type="arabicPeriod"/>
+            </a:pPr>
+            <a:r>
+              <a:rPr lang="en-IN" dirty="0"/>
+              <a:t>Cgs/Cm &gt; 5</a:t>
+            </a:r>
+          </a:p>
+          <a:p>
+            <a:pPr marL="0" lvl="2" indent="0">
+              <a:spcBef>
+                <a:spcPts val="0"/>
+              </a:spcBef>
+              <a:buNone/>
+            </a:pPr>
+            <a:endParaRPr lang="en-IN" dirty="0"/>
+          </a:p>
+        </p:txBody>
+      </p:sp>
+      <p:pic>
+        <p:nvPicPr>
+          <p:cNvPr id="9" name="Content Placeholder 8">
+            <a:extLst>
+              <a:ext uri="{FF2B5EF4-FFF2-40B4-BE49-F238E27FC236}">
+                <a16:creationId xmlns:a16="http://schemas.microsoft.com/office/drawing/2014/main" id="{59B700DE-D2CD-E63E-18CE-486BE9131A6C}"/>
+              </a:ext>
+            </a:extLst>
+          </p:cNvPr>
+          <p:cNvPicPr>
+            <a:picLocks noGrp="1" noChangeAspect="1"/>
+          </p:cNvPicPr>
+          <p:nvPr>
+            <p:ph sz="quarter" idx="14"/>
+          </p:nvPr>
+        </p:nvPicPr>
+        <p:blipFill>
+          <a:blip r:embed="rId3"/>
+          <a:stretch>
+            <a:fillRect/>
+          </a:stretch>
+        </p:blipFill>
+        <p:spPr>
+          <a:xfrm>
+            <a:off x="4387849" y="759001"/>
+            <a:ext cx="3416300" cy="2546157"/>
+          </a:xfrm>
+        </p:spPr>
+      </p:pic>
+      <p:sp>
+        <p:nvSpPr>
+          <p:cNvPr id="7" name="Content Placeholder 6">
+            <a:extLst>
+              <a:ext uri="{FF2B5EF4-FFF2-40B4-BE49-F238E27FC236}">
+                <a16:creationId xmlns:a16="http://schemas.microsoft.com/office/drawing/2014/main" id="{CE0F5865-0709-4BBE-2869-D5CAA8F8B34B}"/>
+              </a:ext>
+            </a:extLst>
+          </p:cNvPr>
+          <p:cNvSpPr>
+            <a:spLocks noGrp="1"/>
+          </p:cNvSpPr>
+          <p:nvPr>
+            <p:ph sz="quarter" idx="15"/>
+          </p:nvPr>
+        </p:nvSpPr>
+        <p:spPr>
+          <a:xfrm>
+            <a:off x="8070849" y="925975"/>
+            <a:ext cx="3617567" cy="4916025"/>
+          </a:xfrm>
+        </p:spPr>
+        <p:txBody>
+          <a:bodyPr/>
+          <a:lstStyle/>
+          <a:p>
+            <a:pPr algn="just"/>
+            <a:r>
               <a:rPr lang="en-US" dirty="0"/>
-              <a:t>…</a:t>
+              <a:t>Calculation:</a:t>
+            </a:r>
+          </a:p>
+          <a:p>
+            <a:endParaRPr lang="en-US" dirty="0"/>
+          </a:p>
+          <a:p>
+            <a:r>
+              <a:rPr lang="en-IN" sz="1600" b="0" dirty="0" err="1">
+                <a:solidFill>
+                  <a:schemeClr val="accent1"/>
+                </a:solidFill>
+              </a:rPr>
+              <a:t>Ceff</a:t>
+            </a:r>
+            <a:r>
+              <a:rPr lang="en-IN" sz="1600" b="0" dirty="0">
+                <a:solidFill>
+                  <a:schemeClr val="accent1"/>
+                </a:solidFill>
+              </a:rPr>
+              <a:t> = Cm + Cgs </a:t>
+            </a:r>
+          </a:p>
+          <a:p>
+            <a:r>
+              <a:rPr lang="en-IN" b="0" dirty="0"/>
+              <a:t>         = (100pF x 10pF)/ (100pF + 10pF)</a:t>
+            </a:r>
+            <a:endParaRPr lang="en-IN" sz="1600" b="0" dirty="0">
+              <a:solidFill>
+                <a:schemeClr val="accent1"/>
+              </a:solidFill>
+            </a:endParaRPr>
+          </a:p>
+          <a:p>
+            <a:r>
+              <a:rPr lang="en-IN" dirty="0"/>
+              <a:t>         </a:t>
+            </a:r>
+            <a:r>
+              <a:rPr lang="en-IN" sz="1600" dirty="0">
+                <a:solidFill>
+                  <a:schemeClr val="accent1"/>
+                </a:solidFill>
+              </a:rPr>
+              <a:t>= 9.09 pF</a:t>
+            </a:r>
+            <a:endParaRPr lang="en-US" sz="1600" dirty="0">
+              <a:solidFill>
+                <a:schemeClr val="accent1"/>
+              </a:solidFill>
+            </a:endParaRPr>
+          </a:p>
+          <a:p>
+            <a:endParaRPr lang="en-US" dirty="0"/>
+          </a:p>
+          <a:p>
+            <a:endParaRPr lang="en-US" dirty="0"/>
+          </a:p>
+          <a:p>
+            <a:pPr algn="just"/>
+            <a:r>
+              <a:rPr lang="el-GR" b="0" dirty="0"/>
+              <a:t>τ</a:t>
+            </a:r>
+            <a:r>
+              <a:rPr lang="en-IN" b="0" dirty="0"/>
+              <a:t>on = Ron(Cm + Cgs)</a:t>
+            </a:r>
+          </a:p>
+          <a:p>
+            <a:pPr algn="just"/>
+            <a:r>
+              <a:rPr lang="en-IN" dirty="0"/>
+              <a:t> </a:t>
+            </a:r>
+            <a:r>
+              <a:rPr lang="en-IN" b="0" dirty="0"/>
+              <a:t>       = </a:t>
+            </a:r>
+            <a:r>
+              <a:rPr lang="en-US" sz="1600" b="0" dirty="0">
+                <a:solidFill>
+                  <a:schemeClr val="accent1"/>
+                </a:solidFill>
+              </a:rPr>
+              <a:t>53 k</a:t>
+            </a:r>
+            <a:r>
+              <a:rPr lang="el-GR" sz="1600" b="0" dirty="0">
+                <a:solidFill>
+                  <a:schemeClr val="accent1"/>
+                </a:solidFill>
+              </a:rPr>
+              <a:t>Ω</a:t>
+            </a:r>
+            <a:r>
+              <a:rPr lang="en-US" sz="1600" b="0" dirty="0">
+                <a:solidFill>
+                  <a:schemeClr val="accent1"/>
+                </a:solidFill>
+              </a:rPr>
+              <a:t> x </a:t>
+            </a:r>
+            <a:r>
+              <a:rPr lang="en-IN" sz="1600" b="0" dirty="0">
+                <a:solidFill>
+                  <a:schemeClr val="accent1"/>
+                </a:solidFill>
+              </a:rPr>
+              <a:t>9.09 pF</a:t>
+            </a:r>
+          </a:p>
+          <a:p>
+            <a:pPr algn="just"/>
+            <a:r>
+              <a:rPr lang="en-IN" dirty="0"/>
+              <a:t>        = 0.48181</a:t>
+            </a:r>
+            <a:r>
+              <a:rPr lang="el-GR" dirty="0"/>
+              <a:t> μ</a:t>
+            </a:r>
+            <a:r>
+              <a:rPr lang="en-IN" dirty="0"/>
+              <a:t>s</a:t>
+            </a:r>
+          </a:p>
+          <a:p>
+            <a:pPr algn="just"/>
+            <a:endParaRPr lang="en-IN" dirty="0"/>
+          </a:p>
+          <a:p>
+            <a:pPr algn="just"/>
+            <a:endParaRPr lang="en-IN" dirty="0"/>
+          </a:p>
+          <a:p>
+            <a:pPr algn="just"/>
+            <a:r>
+              <a:rPr lang="el-GR" b="0" dirty="0"/>
+              <a:t>τ</a:t>
+            </a:r>
+            <a:r>
+              <a:rPr lang="en-IN" b="0" dirty="0"/>
+              <a:t>off = Roff(Cm + Cgs)</a:t>
+            </a:r>
+          </a:p>
+          <a:p>
+            <a:pPr algn="just"/>
+            <a:r>
+              <a:rPr lang="en-IN" b="0" dirty="0"/>
+              <a:t>        = </a:t>
+            </a:r>
+            <a:r>
+              <a:rPr lang="en-IN" sz="1600" b="0" dirty="0">
+                <a:solidFill>
+                  <a:schemeClr val="accent1"/>
+                </a:solidFill>
+              </a:rPr>
+              <a:t>247 k</a:t>
+            </a:r>
+            <a:r>
+              <a:rPr lang="el-GR" sz="1600" b="0" dirty="0">
+                <a:solidFill>
+                  <a:schemeClr val="accent1"/>
+                </a:solidFill>
+              </a:rPr>
+              <a:t>Ω</a:t>
+            </a:r>
+            <a:r>
+              <a:rPr lang="en-US" sz="1600" b="0" dirty="0">
+                <a:solidFill>
+                  <a:schemeClr val="accent1"/>
+                </a:solidFill>
+              </a:rPr>
+              <a:t> x </a:t>
+            </a:r>
+            <a:r>
+              <a:rPr lang="en-IN" sz="1600" b="0" dirty="0">
+                <a:solidFill>
+                  <a:schemeClr val="accent1"/>
+                </a:solidFill>
+              </a:rPr>
+              <a:t>9.09 pF</a:t>
+            </a:r>
+          </a:p>
+          <a:p>
+            <a:pPr algn="just"/>
+            <a:r>
+              <a:rPr lang="en-IN" dirty="0"/>
+              <a:t>        = 2.245 </a:t>
+            </a:r>
+            <a:r>
+              <a:rPr lang="el-GR" dirty="0"/>
+              <a:t>μ</a:t>
+            </a:r>
+            <a:r>
+              <a:rPr lang="en-IN" dirty="0"/>
+              <a:t>s</a:t>
+            </a:r>
+          </a:p>
+          <a:p>
+            <a:endParaRPr lang="en-IN" dirty="0"/>
+          </a:p>
+        </p:txBody>
+      </p:sp>
+      <p:pic>
+        <p:nvPicPr>
+          <p:cNvPr id="5" name="Picture 4">
+            <a:extLst>
+              <a:ext uri="{FF2B5EF4-FFF2-40B4-BE49-F238E27FC236}">
+                <a16:creationId xmlns:a16="http://schemas.microsoft.com/office/drawing/2014/main" id="{42BCC59D-534C-A134-4F11-5AF0F5D44689}"/>
+              </a:ext>
+            </a:extLst>
+          </p:cNvPr>
+          <p:cNvPicPr>
+            <a:picLocks noChangeAspect="1"/>
+          </p:cNvPicPr>
+          <p:nvPr/>
+        </p:nvPicPr>
+        <p:blipFill>
+          <a:blip r:embed="rId4"/>
+          <a:stretch>
+            <a:fillRect/>
+          </a:stretch>
+        </p:blipFill>
+        <p:spPr>
+          <a:xfrm>
+            <a:off x="874712" y="2040738"/>
+            <a:ext cx="3280600" cy="2561079"/>
+          </a:xfrm>
+          <a:prstGeom prst="rect">
+            <a:avLst/>
+          </a:prstGeom>
+        </p:spPr>
+      </p:pic>
+      <p:sp>
+        <p:nvSpPr>
+          <p:cNvPr id="8" name="TextBox 7">
+            <a:extLst>
+              <a:ext uri="{FF2B5EF4-FFF2-40B4-BE49-F238E27FC236}">
+                <a16:creationId xmlns:a16="http://schemas.microsoft.com/office/drawing/2014/main" id="{B1563B4E-EE14-B509-E0B0-A15A69DBE820}"/>
+              </a:ext>
+            </a:extLst>
+          </p:cNvPr>
+          <p:cNvSpPr txBox="1"/>
+          <p:nvPr/>
+        </p:nvSpPr>
+        <p:spPr>
+          <a:xfrm>
+            <a:off x="874712" y="5011003"/>
+            <a:ext cx="3280599" cy="830997"/>
+          </a:xfrm>
+          <a:prstGeom prst="rect">
+            <a:avLst/>
+          </a:prstGeom>
+          <a:noFill/>
+        </p:spPr>
+        <p:txBody>
+          <a:bodyPr wrap="square" rtlCol="0">
+            <a:spAutoFit/>
+          </a:bodyPr>
+          <a:lstStyle/>
+          <a:p>
+            <a:pPr algn="just"/>
+            <a:r>
+              <a:rPr lang="en-IN" sz="800" dirty="0"/>
+              <a:t>R. </a:t>
+            </a:r>
+            <a:r>
+              <a:rPr lang="en-IN" sz="800" dirty="0" err="1"/>
+              <a:t>Schroedter</a:t>
+            </a:r>
+            <a:r>
+              <a:rPr lang="en-IN" sz="800" dirty="0"/>
+              <a:t>, A. S. </a:t>
+            </a:r>
+            <a:r>
+              <a:rPr lang="en-IN" sz="800" dirty="0" err="1"/>
+              <a:t>Demirkol</a:t>
+            </a:r>
+            <a:r>
+              <a:rPr lang="en-IN" sz="800" dirty="0"/>
+              <a:t>, A. Ascoli, B. Max, F. </a:t>
+            </a:r>
+            <a:r>
+              <a:rPr lang="en-IN" sz="800" dirty="0" err="1"/>
+              <a:t>Nebe</a:t>
+            </a:r>
+            <a:r>
+              <a:rPr lang="en-IN" sz="800" dirty="0"/>
+              <a:t>, T. </a:t>
+            </a:r>
+            <a:r>
+              <a:rPr lang="en-IN" sz="800" dirty="0" err="1"/>
+              <a:t>Mikolajick</a:t>
+            </a:r>
+            <a:r>
+              <a:rPr lang="en-IN" sz="800" dirty="0"/>
+              <a:t>,  R. Tetzlaff, "</a:t>
+            </a:r>
+            <a:r>
+              <a:rPr lang="en-IN" sz="800" dirty="0">
+                <a:hlinkClick r:id="rId5"/>
+              </a:rPr>
+              <a:t>A pseudo-memcapacitive </a:t>
+            </a:r>
+            <a:r>
+              <a:rPr lang="en-IN" sz="800" dirty="0" err="1">
+                <a:hlinkClick r:id="rId5"/>
+              </a:rPr>
+              <a:t>neurotransistor</a:t>
+            </a:r>
+            <a:r>
+              <a:rPr lang="en-IN" sz="800" dirty="0">
+                <a:hlinkClick r:id="rId5"/>
+              </a:rPr>
+              <a:t> for spiking neural networks</a:t>
+            </a:r>
+            <a:r>
+              <a:rPr lang="en-IN" sz="800" dirty="0"/>
+              <a:t>", 12th International Conference on Modern Circuits and Systems Technologies (MOCAST) on Electronics and Communications, Athens, Greece, pp. 1-4, 2023, DOI: </a:t>
+            </a:r>
+            <a:r>
+              <a:rPr lang="en-IN" sz="800" dirty="0">
+                <a:hlinkClick r:id="rId5"/>
+              </a:rPr>
+              <a:t>10.1109/MOCAST57943.2023.10176398</a:t>
+            </a:r>
+            <a:endParaRPr lang="en-IN" sz="800" dirty="0"/>
+          </a:p>
+        </p:txBody>
+      </p:sp>
+      <p:sp>
+        <p:nvSpPr>
+          <p:cNvPr id="10" name="TextBox 9">
+            <a:extLst>
+              <a:ext uri="{FF2B5EF4-FFF2-40B4-BE49-F238E27FC236}">
+                <a16:creationId xmlns:a16="http://schemas.microsoft.com/office/drawing/2014/main" id="{5D127641-4743-0853-C404-96F2C68C828B}"/>
+              </a:ext>
+            </a:extLst>
+          </p:cNvPr>
+          <p:cNvSpPr txBox="1"/>
+          <p:nvPr/>
+        </p:nvSpPr>
+        <p:spPr>
+          <a:xfrm>
+            <a:off x="4387849" y="3647918"/>
+            <a:ext cx="3416299" cy="830997"/>
+          </a:xfrm>
+          <a:prstGeom prst="rect">
+            <a:avLst/>
+          </a:prstGeom>
+          <a:noFill/>
+        </p:spPr>
+        <p:txBody>
+          <a:bodyPr wrap="square" rtlCol="0">
+            <a:spAutoFit/>
+          </a:bodyPr>
+          <a:lstStyle/>
+          <a:p>
+            <a:pPr algn="just"/>
+            <a:r>
+              <a:rPr lang="en-IN" sz="800" dirty="0"/>
+              <a:t>R. </a:t>
+            </a:r>
+            <a:r>
+              <a:rPr lang="en-IN" sz="800" dirty="0" err="1"/>
+              <a:t>Schroedter</a:t>
+            </a:r>
+            <a:r>
+              <a:rPr lang="en-IN" sz="800" dirty="0"/>
+              <a:t>, A. S. </a:t>
+            </a:r>
+            <a:r>
+              <a:rPr lang="en-IN" sz="800" dirty="0" err="1"/>
+              <a:t>Demirkol</a:t>
+            </a:r>
+            <a:r>
+              <a:rPr lang="en-IN" sz="800" dirty="0"/>
+              <a:t>, A. Ascoli, R. Tetzlaff, E. </a:t>
+            </a:r>
+            <a:r>
+              <a:rPr lang="en-IN" sz="800" dirty="0" err="1"/>
+              <a:t>Mgeladze</a:t>
+            </a:r>
+            <a:r>
+              <a:rPr lang="en-IN" sz="800" dirty="0"/>
+              <a:t>, M. Herzig, S. </a:t>
+            </a:r>
+            <a:r>
+              <a:rPr lang="en-IN" sz="800" dirty="0" err="1"/>
+              <a:t>Slesazeck</a:t>
+            </a:r>
+            <a:r>
+              <a:rPr lang="en-IN" sz="800" dirty="0"/>
+              <a:t>, T. </a:t>
+            </a:r>
+            <a:r>
+              <a:rPr lang="en-IN" sz="800" dirty="0" err="1"/>
+              <a:t>Mikolajick</a:t>
+            </a:r>
+            <a:r>
+              <a:rPr lang="en-IN" sz="800" dirty="0"/>
+              <a:t>, "</a:t>
+            </a:r>
+            <a:r>
+              <a:rPr lang="en-IN" sz="800" dirty="0">
+                <a:hlinkClick r:id="rId6"/>
+              </a:rPr>
+              <a:t>SPICE Compact Model for an Analog Switching Niobium Oxide Memristor</a:t>
+            </a:r>
+            <a:r>
+              <a:rPr lang="en-IN" sz="800" dirty="0"/>
+              <a:t>", International Conference on Modern Circuits and Systems Technologies (MOCAST) on Electronics and Communications, Bremen, 2022</a:t>
+            </a:r>
+            <a:br>
+              <a:rPr lang="en-IN" sz="800" dirty="0"/>
+            </a:br>
+            <a:r>
+              <a:rPr lang="en-IN" sz="800" dirty="0"/>
+              <a:t>DOI: </a:t>
+            </a:r>
+            <a:r>
+              <a:rPr lang="en-IN" sz="800" dirty="0">
+                <a:hlinkClick r:id="rId7"/>
+              </a:rPr>
+              <a:t>10.1109/MOCAST54814.2022.9837726</a:t>
+            </a:r>
+            <a:endParaRPr lang="en-IN" sz="800" dirty="0"/>
+          </a:p>
+        </p:txBody>
+      </p:sp>
+      <p:sp>
+        <p:nvSpPr>
+          <p:cNvPr id="14" name="TextBox 13">
+            <a:extLst>
+              <a:ext uri="{FF2B5EF4-FFF2-40B4-BE49-F238E27FC236}">
+                <a16:creationId xmlns:a16="http://schemas.microsoft.com/office/drawing/2014/main" id="{385EE477-B903-82C7-B4F1-9CC97A8021DF}"/>
+              </a:ext>
+            </a:extLst>
+          </p:cNvPr>
+          <p:cNvSpPr txBox="1"/>
+          <p:nvPr/>
+        </p:nvSpPr>
+        <p:spPr>
+          <a:xfrm>
+            <a:off x="4387850" y="4760677"/>
+            <a:ext cx="3301724" cy="1077218"/>
+          </a:xfrm>
+          <a:prstGeom prst="rect">
+            <a:avLst/>
+          </a:prstGeom>
+          <a:noFill/>
+        </p:spPr>
+        <p:txBody>
+          <a:bodyPr wrap="square" rtlCol="0">
+            <a:spAutoFit/>
+          </a:bodyPr>
+          <a:lstStyle/>
+          <a:p>
+            <a:pPr marL="0" lvl="2" defTabSz="914269"/>
+            <a:r>
+              <a:rPr lang="en-US" sz="1600" b="1" dirty="0">
+                <a:solidFill>
+                  <a:schemeClr val="accent1"/>
+                </a:solidFill>
+              </a:rPr>
+              <a:t>Values:</a:t>
+            </a:r>
+          </a:p>
+          <a:p>
+            <a:pPr marL="0" lvl="2" defTabSz="914269"/>
+            <a:r>
+              <a:rPr lang="en-US" sz="1600" dirty="0">
+                <a:solidFill>
+                  <a:schemeClr val="accent1"/>
+                </a:solidFill>
+              </a:rPr>
+              <a:t>Ron at 1V = 53k</a:t>
+            </a:r>
+            <a:r>
+              <a:rPr lang="el-GR" sz="1600" dirty="0">
+                <a:solidFill>
+                  <a:schemeClr val="accent1"/>
+                </a:solidFill>
+              </a:rPr>
+              <a:t>Ω</a:t>
+            </a:r>
+            <a:endParaRPr lang="en-US" sz="1600" dirty="0">
+              <a:solidFill>
+                <a:schemeClr val="accent1"/>
+              </a:solidFill>
+            </a:endParaRPr>
+          </a:p>
+          <a:p>
+            <a:pPr marL="0" lvl="2" defTabSz="914269"/>
+            <a:r>
+              <a:rPr lang="en-US" sz="1600" dirty="0">
+                <a:solidFill>
+                  <a:schemeClr val="accent1"/>
+                </a:solidFill>
+              </a:rPr>
+              <a:t>Roff at 1V = </a:t>
+            </a:r>
+            <a:r>
+              <a:rPr lang="en-IN" sz="1600" dirty="0">
+                <a:solidFill>
+                  <a:schemeClr val="accent1"/>
+                </a:solidFill>
+              </a:rPr>
+              <a:t>247k</a:t>
+            </a:r>
+            <a:r>
+              <a:rPr lang="el-GR" sz="1600" dirty="0">
+                <a:solidFill>
+                  <a:schemeClr val="accent1"/>
+                </a:solidFill>
+              </a:rPr>
+              <a:t>Ω</a:t>
+            </a:r>
+            <a:endParaRPr lang="en-US" sz="1600" dirty="0">
+              <a:solidFill>
+                <a:schemeClr val="accent1"/>
+              </a:solidFill>
+            </a:endParaRPr>
+          </a:p>
+          <a:p>
+            <a:pPr marL="0" lvl="2" defTabSz="914269"/>
+            <a:r>
+              <a:rPr lang="en-US" sz="1600" dirty="0">
+                <a:solidFill>
+                  <a:schemeClr val="accent1"/>
+                </a:solidFill>
+              </a:rPr>
+              <a:t>Cgs = 100pF and Cm = 10pF</a:t>
             </a:r>
           </a:p>
         </p:txBody>
@@ -12367,7 +13905,7 @@
     </p:custDataLst>
     <p:extLst>
       <p:ext uri="{BB962C8B-B14F-4D97-AF65-F5344CB8AC3E}">
-        <p14:creationId xmlns:p14="http://schemas.microsoft.com/office/powerpoint/2010/main" val="3672372848"/>
+        <p14:creationId xmlns:p14="http://schemas.microsoft.com/office/powerpoint/2010/main" val="3232030493"/>
       </p:ext>
     </p:extLst>
   </p:cSld>
@@ -12396,7 +13934,13 @@
       </p:grpSpPr>
       <p:sp>
         <p:nvSpPr>
-          <p:cNvPr id="3" name="Titel 2"/>
+          <p:cNvPr id="2" name="Title 1">
+            <a:extLst>
+              <a:ext uri="{FF2B5EF4-FFF2-40B4-BE49-F238E27FC236}">
+                <a16:creationId xmlns:a16="http://schemas.microsoft.com/office/drawing/2014/main" id="{C0B0BF99-23D0-BC87-A497-465C33380B7C}"/>
+              </a:ext>
+            </a:extLst>
+          </p:cNvPr>
           <p:cNvSpPr>
             <a:spLocks noGrp="1"/>
           </p:cNvSpPr>
@@ -12411,49 +13955,429 @@
           <a:p>
             <a:r>
               <a:rPr lang="en-US" dirty="0"/>
-              <a:t>Solution and results</a:t>
-            </a:r>
-            <a:br>
-              <a:rPr lang="en-US" dirty="0"/>
-            </a:br>
-            <a:endParaRPr lang="en-US" b="0" dirty="0"/>
-          </a:p>
-        </p:txBody>
-      </p:sp>
-      <p:sp>
-        <p:nvSpPr>
-          <p:cNvPr id="2" name="Inhaltsplatzhalter 1"/>
-          <p:cNvSpPr>
-            <a:spLocks noGrp="1"/>
-          </p:cNvSpPr>
-          <p:nvPr>
-            <p:ph sz="quarter" idx="10"/>
-          </p:nvPr>
-        </p:nvSpPr>
-        <p:spPr/>
+              <a:t>Approach</a:t>
+            </a:r>
+            <a:endParaRPr lang="en-IN" dirty="0"/>
+          </a:p>
+        </p:txBody>
+      </p:sp>
+      <p:sp>
+        <p:nvSpPr>
+          <p:cNvPr id="4" name="Content Placeholder 3">
+            <a:extLst>
+              <a:ext uri="{FF2B5EF4-FFF2-40B4-BE49-F238E27FC236}">
+                <a16:creationId xmlns:a16="http://schemas.microsoft.com/office/drawing/2014/main" id="{A4241FF2-E734-E7F8-9863-27643C8D1532}"/>
+              </a:ext>
+            </a:extLst>
+          </p:cNvPr>
+          <p:cNvSpPr>
+            <a:spLocks noGrp="1"/>
+          </p:cNvSpPr>
+          <p:nvPr>
+            <p:ph sz="quarter" idx="14"/>
+          </p:nvPr>
+        </p:nvSpPr>
+        <p:spPr>
+          <a:xfrm>
+            <a:off x="874713" y="1030289"/>
+            <a:ext cx="5195887" cy="4811712"/>
+          </a:xfrm>
+        </p:spPr>
         <p:txBody>
           <a:bodyPr/>
           <a:lstStyle/>
           <a:p>
-            <a:pPr lvl="2">
+            <a:pPr algn="just"/>
+            <a:r>
+              <a:rPr lang="en-IN" dirty="0"/>
+              <a:t>Steps for Problem 1</a:t>
+            </a:r>
+          </a:p>
+          <a:p>
+            <a:pPr algn="just"/>
+            <a:endParaRPr lang="en-IN" sz="800" dirty="0"/>
+          </a:p>
+          <a:p>
+            <a:pPr marL="342900" indent="-342900" algn="just">
+              <a:buAutoNum type="arabicPeriod"/>
+            </a:pPr>
+            <a:r>
+              <a:rPr lang="en-IN" b="0" dirty="0"/>
+              <a:t>Input pulse setting for single neuro-transistor.</a:t>
+            </a:r>
+          </a:p>
+          <a:p>
+            <a:pPr marL="342900" indent="-342900" algn="just">
+              <a:buFont typeface="Arial" panose="020B0604020202020204" pitchFamily="34" charset="0"/>
+              <a:buAutoNum type="arabicPeriod"/>
+            </a:pPr>
+            <a:r>
+              <a:rPr lang="en-IN" b="0" dirty="0"/>
+              <a:t>Input pulse setting for 3x1 neuro-transistor.</a:t>
+            </a:r>
+          </a:p>
+          <a:p>
+            <a:pPr marL="342900" indent="-342900" algn="just">
+              <a:buFont typeface="Arial" panose="020B0604020202020204" pitchFamily="34" charset="0"/>
+              <a:buAutoNum type="arabicPeriod"/>
+            </a:pPr>
+            <a:r>
+              <a:rPr lang="en-IN" b="0" dirty="0"/>
+              <a:t>Input pulse setting for 3x3 neuro-transistor.</a:t>
+            </a:r>
+          </a:p>
+          <a:p>
+            <a:pPr marL="342900" indent="-342900" algn="just">
+              <a:buAutoNum type="arabicPeriod"/>
+            </a:pPr>
+            <a:endParaRPr lang="en-IN" b="0" dirty="0"/>
+          </a:p>
+          <a:p>
+            <a:pPr algn="just"/>
+            <a:r>
+              <a:rPr lang="en-IN" dirty="0"/>
+              <a:t>Sweeping Values:</a:t>
+            </a:r>
+          </a:p>
+          <a:p>
+            <a:pPr algn="just"/>
+            <a:endParaRPr lang="en-IN" sz="800" b="0" dirty="0"/>
+          </a:p>
+          <a:p>
+            <a:pPr marL="342900" indent="-342900" algn="just">
+              <a:buAutoNum type="arabicPeriod"/>
+            </a:pPr>
+            <a:r>
+              <a:rPr lang="en-IN" b="0" dirty="0"/>
+              <a:t>Voltage : 0.8V, 1V, 1.2V</a:t>
+            </a:r>
+          </a:p>
+          <a:p>
+            <a:pPr marL="342900" indent="-342900" algn="just">
+              <a:buAutoNum type="arabicPeriod"/>
+            </a:pPr>
+            <a:r>
+              <a:rPr lang="en-IN" b="0" dirty="0"/>
+              <a:t>Ton : 1us, 2us, 3us</a:t>
+            </a:r>
+          </a:p>
+          <a:p>
+            <a:pPr marL="342900" indent="-342900" algn="just">
+              <a:buAutoNum type="arabicPeriod"/>
+            </a:pPr>
+            <a:r>
+              <a:rPr lang="en-IN" b="0" dirty="0" err="1"/>
+              <a:t>Tperiod</a:t>
+            </a:r>
+            <a:r>
+              <a:rPr lang="en-IN" b="0" dirty="0"/>
+              <a:t> : 10us, 50us, 100us</a:t>
+            </a:r>
+          </a:p>
+          <a:p>
+            <a:pPr marL="342900" indent="-342900" algn="just">
+              <a:buAutoNum type="arabicPeriod"/>
+            </a:pPr>
+            <a:r>
+              <a:rPr lang="en-IN" b="0" dirty="0"/>
+              <a:t>State : 0.1, 0.192, 0.284</a:t>
+            </a:r>
+          </a:p>
+          <a:p>
+            <a:pPr marL="342900" indent="-342900" algn="just">
+              <a:buAutoNum type="arabicPeriod"/>
+            </a:pPr>
+            <a:endParaRPr lang="en-IN" sz="800" b="0" dirty="0"/>
+          </a:p>
+          <a:p>
+            <a:pPr marL="342900" indent="-342900" algn="just">
+              <a:buAutoNum type="arabicPeriod"/>
+            </a:pPr>
+            <a:endParaRPr lang="en-IN" sz="800" b="0" dirty="0"/>
+          </a:p>
+          <a:p>
+            <a:pPr algn="just"/>
+            <a:r>
+              <a:rPr lang="en-IN" dirty="0"/>
+              <a:t>NOTE: </a:t>
+            </a:r>
+            <a:r>
+              <a:rPr lang="en-IN" b="0" dirty="0" err="1"/>
+              <a:t>PyLTSpice</a:t>
+            </a:r>
+            <a:r>
+              <a:rPr lang="en-IN" b="0" dirty="0"/>
+              <a:t> library is used to automate multiple run. </a:t>
+            </a:r>
+          </a:p>
+          <a:p>
+            <a:endParaRPr lang="en-IN" dirty="0"/>
+          </a:p>
+        </p:txBody>
+      </p:sp>
+      <p:sp>
+        <p:nvSpPr>
+          <p:cNvPr id="9" name="Content Placeholder 3">
+            <a:extLst>
+              <a:ext uri="{FF2B5EF4-FFF2-40B4-BE49-F238E27FC236}">
+                <a16:creationId xmlns:a16="http://schemas.microsoft.com/office/drawing/2014/main" id="{ED898542-BF3B-57D3-6370-C73E9615DB66}"/>
+              </a:ext>
+            </a:extLst>
+          </p:cNvPr>
+          <p:cNvSpPr txBox="1">
+            <a:spLocks/>
+          </p:cNvSpPr>
+          <p:nvPr/>
+        </p:nvSpPr>
+        <p:spPr>
+          <a:xfrm>
+            <a:off x="6259512" y="1030289"/>
+            <a:ext cx="5195887" cy="4811712"/>
+          </a:xfrm>
+          <a:prstGeom prst="rect">
+            <a:avLst/>
+          </a:prstGeom>
+          <a:ln>
+            <a:noFill/>
+          </a:ln>
+        </p:spPr>
+        <p:txBody>
+          <a:bodyPr vert="horz" lIns="0" tIns="0" rIns="0" bIns="0" rtlCol="0">
+            <a:noAutofit/>
+          </a:bodyPr>
+          <a:lstStyle>
+            <a:lvl1pPr marL="0" indent="0" algn="l" defTabSz="914269" rtl="0" eaLnBrk="1" latinLnBrk="0" hangingPunct="1">
+              <a:spcBef>
+                <a:spcPts val="600"/>
+              </a:spcBef>
+              <a:buFont typeface="Arial" panose="020B0604020202020204" pitchFamily="34" charset="0"/>
+              <a:buNone/>
+              <a:defRPr sz="1600" b="1" kern="1200">
+                <a:solidFill>
+                  <a:schemeClr val="accent1"/>
+                </a:solidFill>
+                <a:latin typeface="+mn-lt"/>
+                <a:ea typeface="+mn-ea"/>
+                <a:cs typeface="+mn-cs"/>
+              </a:defRPr>
+            </a:lvl1pPr>
+            <a:lvl2pPr marL="0" indent="0" algn="l" defTabSz="914269" rtl="0" eaLnBrk="1" latinLnBrk="0" hangingPunct="1">
+              <a:spcBef>
+                <a:spcPts val="600"/>
+              </a:spcBef>
+              <a:buFont typeface="Open Sans" panose="020B0606030504020204" pitchFamily="34" charset="0"/>
+              <a:buNone/>
+              <a:defRPr sz="1600" kern="1200" baseline="0">
+                <a:solidFill>
+                  <a:schemeClr val="accent1"/>
+                </a:solidFill>
+                <a:latin typeface="+mn-lt"/>
+                <a:ea typeface="+mn-ea"/>
+                <a:cs typeface="+mn-cs"/>
+              </a:defRPr>
+            </a:lvl2pPr>
+            <a:lvl3pPr marL="252000" indent="-252000" algn="l" defTabSz="914269" rtl="0" eaLnBrk="1" latinLnBrk="0" hangingPunct="1">
               <a:spcBef>
                 <a:spcPts val="0"/>
               </a:spcBef>
-            </a:pPr>
-            <a:r>
-              <a:rPr lang="en-US" dirty="0"/>
-              <a:t>…</a:t>
-            </a:r>
-          </a:p>
-        </p:txBody>
-      </p:sp>
+              <a:buFont typeface="Arial" panose="020B0604020202020204" pitchFamily="34" charset="0"/>
+              <a:buChar char="—"/>
+              <a:defRPr sz="1600" kern="1200">
+                <a:solidFill>
+                  <a:schemeClr val="accent1"/>
+                </a:solidFill>
+                <a:latin typeface="+mn-lt"/>
+                <a:ea typeface="+mn-ea"/>
+                <a:cs typeface="+mn-cs"/>
+              </a:defRPr>
+            </a:lvl3pPr>
+            <a:lvl4pPr marL="252000" indent="-144000" algn="l" defTabSz="914269" rtl="0" eaLnBrk="1" latinLnBrk="0" hangingPunct="1">
+              <a:spcBef>
+                <a:spcPts val="0"/>
+              </a:spcBef>
+              <a:buFont typeface="Open Sans" panose="020B0606030504020204" pitchFamily="34" charset="0"/>
+              <a:buChar char="–"/>
+              <a:defRPr sz="1600" kern="1200" baseline="0">
+                <a:solidFill>
+                  <a:schemeClr val="accent1"/>
+                </a:solidFill>
+                <a:latin typeface="+mn-lt"/>
+                <a:ea typeface="+mn-ea"/>
+                <a:cs typeface="+mn-cs"/>
+              </a:defRPr>
+            </a:lvl4pPr>
+            <a:lvl5pPr marL="0" indent="0" algn="l" defTabSz="914269" rtl="0" eaLnBrk="1" latinLnBrk="0" hangingPunct="1">
+              <a:spcBef>
+                <a:spcPts val="600"/>
+              </a:spcBef>
+              <a:spcAft>
+                <a:spcPts val="0"/>
+              </a:spcAft>
+              <a:buFont typeface="Symbol" panose="05050102010706020507" pitchFamily="18" charset="2"/>
+              <a:buNone/>
+              <a:defRPr sz="1400" b="1" kern="1200" baseline="0">
+                <a:solidFill>
+                  <a:schemeClr val="accent1"/>
+                </a:solidFill>
+                <a:latin typeface="+mn-lt"/>
+                <a:ea typeface="+mn-ea"/>
+                <a:cs typeface="+mn-cs"/>
+              </a:defRPr>
+            </a:lvl5pPr>
+            <a:lvl6pPr marL="0" marR="0" indent="0" algn="l" defTabSz="914269" rtl="0" eaLnBrk="1" fontAlgn="auto" latinLnBrk="0" hangingPunct="1">
+              <a:lnSpc>
+                <a:spcPct val="100000"/>
+              </a:lnSpc>
+              <a:spcBef>
+                <a:spcPts val="600"/>
+              </a:spcBef>
+              <a:spcAft>
+                <a:spcPts val="0"/>
+              </a:spcAft>
+              <a:buClrTx/>
+              <a:buSzTx/>
+              <a:buFont typeface="Arial" panose="020B0604020202020204" pitchFamily="34" charset="0"/>
+              <a:buNone/>
+              <a:tabLst/>
+              <a:defRPr sz="1400" b="0" kern="1200">
+                <a:solidFill>
+                  <a:schemeClr val="accent1"/>
+                </a:solidFill>
+                <a:latin typeface="+mn-lt"/>
+                <a:ea typeface="+mn-ea"/>
+                <a:cs typeface="+mn-cs"/>
+              </a:defRPr>
+            </a:lvl6pPr>
+            <a:lvl7pPr marL="252000" marR="0" indent="-252000" algn="l" defTabSz="914269" rtl="0" eaLnBrk="1" fontAlgn="auto" latinLnBrk="0" hangingPunct="1">
+              <a:lnSpc>
+                <a:spcPct val="100000"/>
+              </a:lnSpc>
+              <a:spcBef>
+                <a:spcPts val="0"/>
+              </a:spcBef>
+              <a:spcAft>
+                <a:spcPts val="0"/>
+              </a:spcAft>
+              <a:buClrTx/>
+              <a:buSzTx/>
+              <a:buFont typeface="Arial" panose="020B0604020202020204" pitchFamily="34" charset="0"/>
+              <a:buChar char="—"/>
+              <a:tabLst/>
+              <a:defRPr lang="de-DE" sz="1400" kern="1200" dirty="0" smtClean="0">
+                <a:solidFill>
+                  <a:schemeClr val="accent1"/>
+                </a:solidFill>
+                <a:latin typeface="+mn-lt"/>
+                <a:ea typeface="+mn-ea"/>
+                <a:cs typeface="+mn-cs"/>
+              </a:defRPr>
+            </a:lvl7pPr>
+            <a:lvl8pPr marL="252000" marR="0" indent="-144000" algn="l" defTabSz="914269" rtl="0" eaLnBrk="1" fontAlgn="auto" latinLnBrk="0" hangingPunct="1">
+              <a:lnSpc>
+                <a:spcPct val="100000"/>
+              </a:lnSpc>
+              <a:spcBef>
+                <a:spcPts val="0"/>
+              </a:spcBef>
+              <a:spcAft>
+                <a:spcPts val="0"/>
+              </a:spcAft>
+              <a:buClrTx/>
+              <a:buSzTx/>
+              <a:buFont typeface="Open Sans" panose="020B0606030504020204" pitchFamily="34" charset="0"/>
+              <a:buChar char="–"/>
+              <a:tabLst/>
+              <a:defRPr sz="1400" kern="1200" baseline="0">
+                <a:solidFill>
+                  <a:schemeClr val="accent1"/>
+                </a:solidFill>
+                <a:latin typeface="+mn-lt"/>
+                <a:ea typeface="+mn-ea"/>
+                <a:cs typeface="+mn-cs"/>
+              </a:defRPr>
+            </a:lvl8pPr>
+            <a:lvl9pPr marL="396000" marR="0" indent="-144000" algn="l" defTabSz="914269" rtl="0" eaLnBrk="1" fontAlgn="auto" latinLnBrk="0" hangingPunct="1">
+              <a:lnSpc>
+                <a:spcPct val="100000"/>
+              </a:lnSpc>
+              <a:spcBef>
+                <a:spcPts val="0"/>
+              </a:spcBef>
+              <a:spcAft>
+                <a:spcPts val="0"/>
+              </a:spcAft>
+              <a:buClrTx/>
+              <a:buSzTx/>
+              <a:buFont typeface="Wingdings" panose="05000000000000000000" pitchFamily="2" charset="2"/>
+              <a:buChar char="§"/>
+              <a:tabLst/>
+              <a:defRPr sz="1400" kern="1200">
+                <a:solidFill>
+                  <a:schemeClr val="accent1"/>
+                </a:solidFill>
+                <a:latin typeface="+mn-lt"/>
+                <a:ea typeface="+mn-ea"/>
+                <a:cs typeface="+mn-cs"/>
+              </a:defRPr>
+            </a:lvl9pPr>
+          </a:lstStyle>
+          <a:p>
+            <a:pPr algn="just"/>
+            <a:r>
+              <a:rPr lang="en-IN" dirty="0"/>
+              <a:t>Steps for Problem 2</a:t>
+            </a:r>
+          </a:p>
+          <a:p>
+            <a:pPr algn="just"/>
+            <a:endParaRPr lang="en-IN" sz="800" dirty="0"/>
+          </a:p>
+          <a:p>
+            <a:pPr algn="just"/>
+            <a:r>
+              <a:rPr lang="en-US" b="0" dirty="0"/>
+              <a:t>Used current to voltage amplifier to Cascade neuro-transistor.</a:t>
+            </a:r>
+          </a:p>
+          <a:p>
+            <a:endParaRPr lang="en-IN" dirty="0"/>
+          </a:p>
+        </p:txBody>
+      </p:sp>
+      <p:pic>
+        <p:nvPicPr>
+          <p:cNvPr id="12" name="Picture 11">
+            <a:extLst>
+              <a:ext uri="{FF2B5EF4-FFF2-40B4-BE49-F238E27FC236}">
+                <a16:creationId xmlns:a16="http://schemas.microsoft.com/office/drawing/2014/main" id="{986D4240-0191-C9E1-19D0-330AD71FDA49}"/>
+              </a:ext>
+            </a:extLst>
+          </p:cNvPr>
+          <p:cNvPicPr>
+            <a:picLocks noChangeAspect="1"/>
+          </p:cNvPicPr>
+          <p:nvPr/>
+        </p:nvPicPr>
+        <p:blipFill>
+          <a:blip r:embed="rId2"/>
+          <a:stretch>
+            <a:fillRect/>
+          </a:stretch>
+        </p:blipFill>
+        <p:spPr>
+          <a:xfrm>
+            <a:off x="7521640" y="2216426"/>
+            <a:ext cx="2924386" cy="3367951"/>
+          </a:xfrm>
+          <a:prstGeom prst="rect">
+            <a:avLst/>
+          </a:prstGeom>
+        </p:spPr>
+      </p:pic>
     </p:spTree>
-    <p:custDataLst>
-      <p:tags r:id="rId1"/>
-    </p:custDataLst>
     <p:extLst>
       <p:ext uri="{BB962C8B-B14F-4D97-AF65-F5344CB8AC3E}">
-        <p14:creationId xmlns:p14="http://schemas.microsoft.com/office/powerpoint/2010/main" val="2641189355"/>
+        <p14:creationId xmlns:p14="http://schemas.microsoft.com/office/powerpoint/2010/main" val="1927111925"/>
       </p:ext>
     </p:extLst>
   </p:cSld>
@@ -12490,14 +14414,306 @@
             <p:ph type="title"/>
           </p:nvPr>
         </p:nvSpPr>
-        <p:spPr/>
+        <p:spPr>
+          <a:xfrm>
+            <a:off x="874711" y="346076"/>
+            <a:ext cx="10580687" cy="684213"/>
+          </a:xfrm>
+        </p:spPr>
         <p:txBody>
           <a:bodyPr/>
           <a:lstStyle/>
           <a:p>
             <a:r>
               <a:rPr lang="en-US" dirty="0"/>
-              <a:t>Take-home message and summary</a:t>
+              <a:t>Single </a:t>
+            </a:r>
+            <a:r>
+              <a:rPr lang="en-IN" dirty="0"/>
+              <a:t>neuro-transistor</a:t>
+            </a:r>
+            <a:br>
+              <a:rPr lang="en-US" dirty="0"/>
+            </a:br>
+            <a:endParaRPr lang="en-US" b="0" dirty="0"/>
+          </a:p>
+        </p:txBody>
+      </p:sp>
+      <p:pic>
+        <p:nvPicPr>
+          <p:cNvPr id="13" name="Content Placeholder 12">
+            <a:extLst>
+              <a:ext uri="{FF2B5EF4-FFF2-40B4-BE49-F238E27FC236}">
+                <a16:creationId xmlns:a16="http://schemas.microsoft.com/office/drawing/2014/main" id="{07D6EF1D-0EF6-D6C5-79E9-2C1A3B403A06}"/>
+              </a:ext>
+            </a:extLst>
+          </p:cNvPr>
+          <p:cNvPicPr>
+            <a:picLocks noGrp="1" noChangeAspect="1"/>
+          </p:cNvPicPr>
+          <p:nvPr>
+            <p:ph sz="quarter" idx="10"/>
+          </p:nvPr>
+        </p:nvPicPr>
+        <p:blipFill>
+          <a:blip r:embed="rId3"/>
+          <a:stretch>
+            <a:fillRect/>
+          </a:stretch>
+        </p:blipFill>
+        <p:spPr>
+          <a:xfrm>
+            <a:off x="4894986" y="688182"/>
+            <a:ext cx="6560412" cy="2680182"/>
+          </a:xfrm>
+        </p:spPr>
+      </p:pic>
+      <p:pic>
+        <p:nvPicPr>
+          <p:cNvPr id="15" name="Picture 14">
+            <a:extLst>
+              <a:ext uri="{FF2B5EF4-FFF2-40B4-BE49-F238E27FC236}">
+                <a16:creationId xmlns:a16="http://schemas.microsoft.com/office/drawing/2014/main" id="{B7D96B18-97AE-698D-834A-1287B9CB8A32}"/>
+              </a:ext>
+            </a:extLst>
+          </p:cNvPr>
+          <p:cNvPicPr>
+            <a:picLocks noChangeAspect="1"/>
+          </p:cNvPicPr>
+          <p:nvPr/>
+        </p:nvPicPr>
+        <p:blipFill>
+          <a:blip r:embed="rId4" cstate="print">
+            <a:extLst>
+              <a:ext uri="{28A0092B-C50C-407E-A947-70E740481C1C}">
+                <a14:useLocalDpi xmlns:a14="http://schemas.microsoft.com/office/drawing/2010/main" val="0"/>
+              </a:ext>
+            </a:extLst>
+          </a:blip>
+          <a:stretch>
+            <a:fillRect/>
+          </a:stretch>
+        </p:blipFill>
+        <p:spPr>
+          <a:xfrm>
+            <a:off x="874711" y="786883"/>
+            <a:ext cx="4020275" cy="2680183"/>
+          </a:xfrm>
+          <a:prstGeom prst="rect">
+            <a:avLst/>
+          </a:prstGeom>
+        </p:spPr>
+      </p:pic>
+      <p:pic>
+        <p:nvPicPr>
+          <p:cNvPr id="17" name="Picture 16">
+            <a:extLst>
+              <a:ext uri="{FF2B5EF4-FFF2-40B4-BE49-F238E27FC236}">
+                <a16:creationId xmlns:a16="http://schemas.microsoft.com/office/drawing/2014/main" id="{37D68846-6B28-30D5-1FB9-6425A1A141F6}"/>
+              </a:ext>
+            </a:extLst>
+          </p:cNvPr>
+          <p:cNvPicPr>
+            <a:picLocks noChangeAspect="1"/>
+          </p:cNvPicPr>
+          <p:nvPr/>
+        </p:nvPicPr>
+        <p:blipFill>
+          <a:blip r:embed="rId5" cstate="print">
+            <a:extLst>
+              <a:ext uri="{28A0092B-C50C-407E-A947-70E740481C1C}">
+                <a14:useLocalDpi xmlns:a14="http://schemas.microsoft.com/office/drawing/2010/main" val="0"/>
+              </a:ext>
+            </a:extLst>
+          </a:blip>
+          <a:stretch>
+            <a:fillRect/>
+          </a:stretch>
+        </p:blipFill>
+        <p:spPr>
+          <a:xfrm>
+            <a:off x="874711" y="3518452"/>
+            <a:ext cx="4020275" cy="2680183"/>
+          </a:xfrm>
+          <a:prstGeom prst="rect">
+            <a:avLst/>
+          </a:prstGeom>
+        </p:spPr>
+      </p:pic>
+      <p:pic>
+        <p:nvPicPr>
+          <p:cNvPr id="19" name="Picture 18">
+            <a:extLst>
+              <a:ext uri="{FF2B5EF4-FFF2-40B4-BE49-F238E27FC236}">
+                <a16:creationId xmlns:a16="http://schemas.microsoft.com/office/drawing/2014/main" id="{FF9E4F81-8456-FD3D-A3CA-A93CA2522E27}"/>
+              </a:ext>
+            </a:extLst>
+          </p:cNvPr>
+          <p:cNvPicPr>
+            <a:picLocks noChangeAspect="1"/>
+          </p:cNvPicPr>
+          <p:nvPr/>
+        </p:nvPicPr>
+        <p:blipFill>
+          <a:blip r:embed="rId6" cstate="print">
+            <a:extLst>
+              <a:ext uri="{28A0092B-C50C-407E-A947-70E740481C1C}">
+                <a14:useLocalDpi xmlns:a14="http://schemas.microsoft.com/office/drawing/2010/main" val="0"/>
+              </a:ext>
+            </a:extLst>
+          </a:blip>
+          <a:stretch>
+            <a:fillRect/>
+          </a:stretch>
+        </p:blipFill>
+        <p:spPr>
+          <a:xfrm>
+            <a:off x="4894986" y="3518452"/>
+            <a:ext cx="4020275" cy="2680183"/>
+          </a:xfrm>
+          <a:prstGeom prst="rect">
+            <a:avLst/>
+          </a:prstGeom>
+        </p:spPr>
+      </p:pic>
+      <p:sp>
+        <p:nvSpPr>
+          <p:cNvPr id="20" name="TextBox 19">
+            <a:extLst>
+              <a:ext uri="{FF2B5EF4-FFF2-40B4-BE49-F238E27FC236}">
+                <a16:creationId xmlns:a16="http://schemas.microsoft.com/office/drawing/2014/main" id="{7C60D794-3750-05CE-4E6D-A31167F2862B}"/>
+              </a:ext>
+            </a:extLst>
+          </p:cNvPr>
+          <p:cNvSpPr txBox="1"/>
+          <p:nvPr/>
+        </p:nvSpPr>
+        <p:spPr>
+          <a:xfrm>
+            <a:off x="8915261" y="4196823"/>
+            <a:ext cx="2540137" cy="1323439"/>
+          </a:xfrm>
+          <a:prstGeom prst="rect">
+            <a:avLst/>
+          </a:prstGeom>
+          <a:noFill/>
+        </p:spPr>
+        <p:txBody>
+          <a:bodyPr wrap="square" rtlCol="0">
+            <a:spAutoFit/>
+          </a:bodyPr>
+          <a:lstStyle/>
+          <a:p>
+            <a:r>
+              <a:rPr lang="en-US" sz="1600" b="1" dirty="0">
+                <a:solidFill>
+                  <a:schemeClr val="accent1"/>
+                </a:solidFill>
+                <a:latin typeface="+mj-lt"/>
+                <a:ea typeface="+mj-ea"/>
+                <a:cs typeface="+mj-cs"/>
+              </a:rPr>
+              <a:t>Observation:</a:t>
+            </a:r>
+            <a:br>
+              <a:rPr lang="en-US" sz="2400" b="1" dirty="0">
+                <a:solidFill>
+                  <a:schemeClr val="accent1"/>
+                </a:solidFill>
+                <a:latin typeface="+mj-lt"/>
+                <a:ea typeface="+mj-ea"/>
+                <a:cs typeface="+mj-cs"/>
+              </a:rPr>
+            </a:br>
+            <a:r>
+              <a:rPr lang="en-US" sz="1600" dirty="0">
+                <a:solidFill>
+                  <a:schemeClr val="accent1"/>
+                </a:solidFill>
+                <a:latin typeface="+mj-lt"/>
+                <a:ea typeface="+mj-ea"/>
+                <a:cs typeface="+mj-cs"/>
+              </a:rPr>
+              <a:t>Nice gap between the On State current value and Off state current value.</a:t>
+            </a:r>
+            <a:endParaRPr lang="en-IN" sz="1600" dirty="0">
+              <a:solidFill>
+                <a:schemeClr val="accent1"/>
+              </a:solidFill>
+              <a:latin typeface="+mj-lt"/>
+              <a:ea typeface="+mj-ea"/>
+              <a:cs typeface="+mj-cs"/>
+            </a:endParaRPr>
+          </a:p>
+        </p:txBody>
+      </p:sp>
+    </p:spTree>
+    <p:custDataLst>
+      <p:tags r:id="rId1"/>
+    </p:custDataLst>
+    <p:extLst>
+      <p:ext uri="{BB962C8B-B14F-4D97-AF65-F5344CB8AC3E}">
+        <p14:creationId xmlns:p14="http://schemas.microsoft.com/office/powerpoint/2010/main" val="2641189355"/>
+      </p:ext>
+    </p:extLst>
+  </p:cSld>
+  <p:clrMapOvr>
+    <a:masterClrMapping/>
+  </p:clrMapOvr>
+</p:sld>
+</file>
+
+<file path=ppt/slides/slide7.xml><?xml version="1.0" encoding="utf-8"?>
+<p:sld xmlns:a="http://schemas.openxmlformats.org/drawingml/2006/main" xmlns:r="http://schemas.openxmlformats.org/officeDocument/2006/relationships" xmlns:p="http://schemas.openxmlformats.org/presentationml/2006/main">
+  <p:cSld>
+    <p:spTree>
+      <p:nvGrpSpPr>
+        <p:cNvPr id="1" name="">
+          <a:extLst>
+            <a:ext uri="{FF2B5EF4-FFF2-40B4-BE49-F238E27FC236}">
+              <a16:creationId xmlns:a16="http://schemas.microsoft.com/office/drawing/2014/main" id="{4913E6FF-10E5-C55C-F566-94AC73477352}"/>
+            </a:ext>
+          </a:extLst>
+        </p:cNvPr>
+        <p:cNvGrpSpPr/>
+        <p:nvPr/>
+      </p:nvGrpSpPr>
+      <p:grpSpPr>
+        <a:xfrm>
+          <a:off x="0" y="0"/>
+          <a:ext cx="0" cy="0"/>
+          <a:chOff x="0" y="0"/>
+          <a:chExt cx="0" cy="0"/>
+        </a:xfrm>
+      </p:grpSpPr>
+      <p:sp>
+        <p:nvSpPr>
+          <p:cNvPr id="3" name="Titel 2">
+            <a:extLst>
+              <a:ext uri="{FF2B5EF4-FFF2-40B4-BE49-F238E27FC236}">
+                <a16:creationId xmlns:a16="http://schemas.microsoft.com/office/drawing/2014/main" id="{4383B450-D31F-521A-2B2E-D9B979D0BEA1}"/>
+              </a:ext>
+            </a:extLst>
+          </p:cNvPr>
+          <p:cNvSpPr>
+            <a:spLocks noGrp="1"/>
+          </p:cNvSpPr>
+          <p:nvPr>
+            <p:ph type="title"/>
+          </p:nvPr>
+        </p:nvSpPr>
+        <p:spPr/>
+        <p:txBody>
+          <a:bodyPr/>
+          <a:lstStyle/>
+          <a:p>
+            <a:r>
+              <a:rPr lang="en-US" dirty="0"/>
+              <a:t>3x1 </a:t>
+            </a:r>
+            <a:r>
+              <a:rPr lang="en-IN" dirty="0"/>
+              <a:t>neuro-transistor</a:t>
             </a:r>
             <a:br>
               <a:rPr lang="en-US" dirty="0"/>
@@ -12509,14 +14725,405 @@
           </a:p>
         </p:txBody>
       </p:sp>
-      <p:sp>
-        <p:nvSpPr>
-          <p:cNvPr id="2" name="Inhaltsplatzhalter 1"/>
-          <p:cNvSpPr>
-            <a:spLocks noGrp="1"/>
-          </p:cNvSpPr>
+      <p:pic>
+        <p:nvPicPr>
+          <p:cNvPr id="5" name="Content Placeholder 4">
+            <a:extLst>
+              <a:ext uri="{FF2B5EF4-FFF2-40B4-BE49-F238E27FC236}">
+                <a16:creationId xmlns:a16="http://schemas.microsoft.com/office/drawing/2014/main" id="{5C03DA38-3634-8E95-8466-CF2EFA4B666B}"/>
+              </a:ext>
+            </a:extLst>
+          </p:cNvPr>
+          <p:cNvPicPr>
+            <a:picLocks noGrp="1" noChangeAspect="1"/>
+          </p:cNvPicPr>
           <p:nvPr>
             <p:ph sz="quarter" idx="10"/>
+          </p:nvPr>
+        </p:nvPicPr>
+        <p:blipFill>
+          <a:blip r:embed="rId3"/>
+          <a:stretch>
+            <a:fillRect/>
+          </a:stretch>
+        </p:blipFill>
+        <p:spPr>
+          <a:xfrm>
+            <a:off x="736602" y="894523"/>
+            <a:ext cx="3519489" cy="4313581"/>
+          </a:xfrm>
+        </p:spPr>
+      </p:pic>
+      <p:pic>
+        <p:nvPicPr>
+          <p:cNvPr id="7" name="Picture 6">
+            <a:extLst>
+              <a:ext uri="{FF2B5EF4-FFF2-40B4-BE49-F238E27FC236}">
+                <a16:creationId xmlns:a16="http://schemas.microsoft.com/office/drawing/2014/main" id="{C9F8734F-6C24-185A-0D87-18CD3F2E928D}"/>
+              </a:ext>
+            </a:extLst>
+          </p:cNvPr>
+          <p:cNvPicPr>
+            <a:picLocks noChangeAspect="1"/>
+          </p:cNvPicPr>
+          <p:nvPr/>
+        </p:nvPicPr>
+        <p:blipFill>
+          <a:blip r:embed="rId4" cstate="print">
+            <a:extLst>
+              <a:ext uri="{28A0092B-C50C-407E-A947-70E740481C1C}">
+                <a14:useLocalDpi xmlns:a14="http://schemas.microsoft.com/office/drawing/2010/main" val="0"/>
+              </a:ext>
+            </a:extLst>
+          </a:blip>
+          <a:stretch>
+            <a:fillRect/>
+          </a:stretch>
+        </p:blipFill>
+        <p:spPr>
+          <a:xfrm>
+            <a:off x="4561025" y="1120534"/>
+            <a:ext cx="3519489" cy="2398712"/>
+          </a:xfrm>
+          <a:prstGeom prst="rect">
+            <a:avLst/>
+          </a:prstGeom>
+        </p:spPr>
+      </p:pic>
+      <p:pic>
+        <p:nvPicPr>
+          <p:cNvPr id="9" name="Picture 8">
+            <a:extLst>
+              <a:ext uri="{FF2B5EF4-FFF2-40B4-BE49-F238E27FC236}">
+                <a16:creationId xmlns:a16="http://schemas.microsoft.com/office/drawing/2014/main" id="{B66CC432-6957-9D82-9435-0AE791D9EBE0}"/>
+              </a:ext>
+            </a:extLst>
+          </p:cNvPr>
+          <p:cNvPicPr>
+            <a:picLocks noChangeAspect="1"/>
+          </p:cNvPicPr>
+          <p:nvPr/>
+        </p:nvPicPr>
+        <p:blipFill>
+          <a:blip r:embed="rId5" cstate="print">
+            <a:extLst>
+              <a:ext uri="{28A0092B-C50C-407E-A947-70E740481C1C}">
+                <a14:useLocalDpi xmlns:a14="http://schemas.microsoft.com/office/drawing/2010/main" val="0"/>
+              </a:ext>
+            </a:extLst>
+          </a:blip>
+          <a:stretch>
+            <a:fillRect/>
+          </a:stretch>
+        </p:blipFill>
+        <p:spPr>
+          <a:xfrm>
+            <a:off x="4561025" y="3609492"/>
+            <a:ext cx="3519489" cy="2398713"/>
+          </a:xfrm>
+          <a:prstGeom prst="rect">
+            <a:avLst/>
+          </a:prstGeom>
+        </p:spPr>
+      </p:pic>
+      <p:sp>
+        <p:nvSpPr>
+          <p:cNvPr id="14" name="TextBox 13">
+            <a:extLst>
+              <a:ext uri="{FF2B5EF4-FFF2-40B4-BE49-F238E27FC236}">
+                <a16:creationId xmlns:a16="http://schemas.microsoft.com/office/drawing/2014/main" id="{FE9545DE-E63C-0626-E98D-267DD81ED5E4}"/>
+              </a:ext>
+            </a:extLst>
+          </p:cNvPr>
+          <p:cNvSpPr txBox="1"/>
+          <p:nvPr/>
+        </p:nvSpPr>
+        <p:spPr>
+          <a:xfrm>
+            <a:off x="5013774" y="733779"/>
+            <a:ext cx="2613991" cy="341632"/>
+          </a:xfrm>
+          <a:prstGeom prst="rect">
+            <a:avLst/>
+          </a:prstGeom>
+          <a:noFill/>
+        </p:spPr>
+        <p:txBody>
+          <a:bodyPr wrap="square" rtlCol="0">
+            <a:spAutoFit/>
+          </a:bodyPr>
+          <a:lstStyle/>
+          <a:p>
+            <a:pPr algn="ctr"/>
+            <a:r>
+              <a:rPr lang="en-US" b="1" dirty="0">
+                <a:solidFill>
+                  <a:srgbClr val="DE2526"/>
+                </a:solidFill>
+              </a:rPr>
+              <a:t>Pulse Input</a:t>
+            </a:r>
+            <a:endParaRPr lang="en-IN" b="1" dirty="0">
+              <a:solidFill>
+                <a:srgbClr val="DE2526"/>
+              </a:solidFill>
+            </a:endParaRPr>
+          </a:p>
+        </p:txBody>
+      </p:sp>
+      <p:sp>
+        <p:nvSpPr>
+          <p:cNvPr id="15" name="TextBox 14">
+            <a:extLst>
+              <a:ext uri="{FF2B5EF4-FFF2-40B4-BE49-F238E27FC236}">
+                <a16:creationId xmlns:a16="http://schemas.microsoft.com/office/drawing/2014/main" id="{1831F9C9-68C6-DAA5-67A7-ACFCEE299157}"/>
+              </a:ext>
+            </a:extLst>
+          </p:cNvPr>
+          <p:cNvSpPr txBox="1"/>
+          <p:nvPr/>
+        </p:nvSpPr>
+        <p:spPr>
+          <a:xfrm>
+            <a:off x="8696437" y="723707"/>
+            <a:ext cx="2613991" cy="341632"/>
+          </a:xfrm>
+          <a:prstGeom prst="rect">
+            <a:avLst/>
+          </a:prstGeom>
+          <a:noFill/>
+        </p:spPr>
+        <p:txBody>
+          <a:bodyPr wrap="square" rtlCol="0">
+            <a:spAutoFit/>
+          </a:bodyPr>
+          <a:lstStyle/>
+          <a:p>
+            <a:pPr algn="ctr"/>
+            <a:r>
+              <a:rPr lang="en-US" b="1" dirty="0">
+                <a:solidFill>
+                  <a:srgbClr val="DE2526"/>
+                </a:solidFill>
+              </a:rPr>
+              <a:t>TTFS Input</a:t>
+            </a:r>
+            <a:endParaRPr lang="en-IN" b="1" dirty="0">
+              <a:solidFill>
+                <a:srgbClr val="DE2526"/>
+              </a:solidFill>
+            </a:endParaRPr>
+          </a:p>
+        </p:txBody>
+      </p:sp>
+      <p:pic>
+        <p:nvPicPr>
+          <p:cNvPr id="17" name="Picture 16">
+            <a:extLst>
+              <a:ext uri="{FF2B5EF4-FFF2-40B4-BE49-F238E27FC236}">
+                <a16:creationId xmlns:a16="http://schemas.microsoft.com/office/drawing/2014/main" id="{F5EF8598-E1D7-82AA-A023-00F519F7869D}"/>
+              </a:ext>
+            </a:extLst>
+          </p:cNvPr>
+          <p:cNvPicPr>
+            <a:picLocks noChangeAspect="1"/>
+          </p:cNvPicPr>
+          <p:nvPr/>
+        </p:nvPicPr>
+        <p:blipFill>
+          <a:blip r:embed="rId6" cstate="print">
+            <a:extLst>
+              <a:ext uri="{28A0092B-C50C-407E-A947-70E740481C1C}">
+                <a14:useLocalDpi xmlns:a14="http://schemas.microsoft.com/office/drawing/2010/main" val="0"/>
+              </a:ext>
+            </a:extLst>
+          </a:blip>
+          <a:stretch>
+            <a:fillRect/>
+          </a:stretch>
+        </p:blipFill>
+        <p:spPr>
+          <a:xfrm>
+            <a:off x="8385447" y="1120534"/>
+            <a:ext cx="3235971" cy="2308466"/>
+          </a:xfrm>
+          <a:prstGeom prst="rect">
+            <a:avLst/>
+          </a:prstGeom>
+        </p:spPr>
+      </p:pic>
+      <p:pic>
+        <p:nvPicPr>
+          <p:cNvPr id="19" name="Picture 18">
+            <a:extLst>
+              <a:ext uri="{FF2B5EF4-FFF2-40B4-BE49-F238E27FC236}">
+                <a16:creationId xmlns:a16="http://schemas.microsoft.com/office/drawing/2014/main" id="{A39AD2BF-00C0-5C92-C906-58F20D8141C5}"/>
+              </a:ext>
+            </a:extLst>
+          </p:cNvPr>
+          <p:cNvPicPr>
+            <a:picLocks noChangeAspect="1"/>
+          </p:cNvPicPr>
+          <p:nvPr/>
+        </p:nvPicPr>
+        <p:blipFill>
+          <a:blip r:embed="rId7" cstate="print">
+            <a:extLst>
+              <a:ext uri="{28A0092B-C50C-407E-A947-70E740481C1C}">
+                <a14:useLocalDpi xmlns:a14="http://schemas.microsoft.com/office/drawing/2010/main" val="0"/>
+              </a:ext>
+            </a:extLst>
+          </a:blip>
+          <a:stretch>
+            <a:fillRect/>
+          </a:stretch>
+        </p:blipFill>
+        <p:spPr>
+          <a:xfrm>
+            <a:off x="8385447" y="3609491"/>
+            <a:ext cx="3235971" cy="2398713"/>
+          </a:xfrm>
+          <a:prstGeom prst="rect">
+            <a:avLst/>
+          </a:prstGeom>
+        </p:spPr>
+      </p:pic>
+      <p:sp>
+        <p:nvSpPr>
+          <p:cNvPr id="20" name="TextBox 19">
+            <a:extLst>
+              <a:ext uri="{FF2B5EF4-FFF2-40B4-BE49-F238E27FC236}">
+                <a16:creationId xmlns:a16="http://schemas.microsoft.com/office/drawing/2014/main" id="{C44D1EC1-BA73-C2FF-96DE-D48402B8BEC4}"/>
+              </a:ext>
+            </a:extLst>
+          </p:cNvPr>
+          <p:cNvSpPr txBox="1"/>
+          <p:nvPr/>
+        </p:nvSpPr>
+        <p:spPr>
+          <a:xfrm>
+            <a:off x="736602" y="5330810"/>
+            <a:ext cx="3519489" cy="584775"/>
+          </a:xfrm>
+          <a:prstGeom prst="rect">
+            <a:avLst/>
+          </a:prstGeom>
+          <a:noFill/>
+        </p:spPr>
+        <p:txBody>
+          <a:bodyPr wrap="square" rtlCol="0">
+            <a:spAutoFit/>
+          </a:bodyPr>
+          <a:lstStyle/>
+          <a:p>
+            <a:pPr algn="just"/>
+            <a:r>
+              <a:rPr lang="en-US" sz="1600" b="1" dirty="0">
+                <a:solidFill>
+                  <a:schemeClr val="accent1"/>
+                </a:solidFill>
+                <a:latin typeface="+mj-lt"/>
+                <a:ea typeface="+mj-ea"/>
+                <a:cs typeface="+mj-cs"/>
+              </a:rPr>
+              <a:t>TTFS Input: </a:t>
+            </a:r>
+            <a:r>
+              <a:rPr lang="en-US" sz="1600" dirty="0">
+                <a:solidFill>
+                  <a:schemeClr val="accent1"/>
+                </a:solidFill>
+                <a:latin typeface="+mj-lt"/>
+                <a:ea typeface="+mj-ea"/>
+                <a:cs typeface="+mj-cs"/>
+              </a:rPr>
+              <a:t>A1.png from Project1,</a:t>
+            </a:r>
+            <a:br>
+              <a:rPr lang="en-US" sz="1600" dirty="0">
+                <a:solidFill>
+                  <a:schemeClr val="accent1"/>
+                </a:solidFill>
+                <a:latin typeface="+mj-lt"/>
+                <a:ea typeface="+mj-ea"/>
+                <a:cs typeface="+mj-cs"/>
+              </a:rPr>
+            </a:br>
+            <a:r>
+              <a:rPr lang="en-US" sz="1600" dirty="0">
+                <a:solidFill>
+                  <a:schemeClr val="accent1"/>
+                </a:solidFill>
+                <a:latin typeface="+mj-lt"/>
+                <a:ea typeface="+mj-ea"/>
+                <a:cs typeface="+mj-cs"/>
+              </a:rPr>
+              <a:t>resized to 3x3 pixels.</a:t>
+            </a:r>
+            <a:endParaRPr lang="en-IN" sz="1600" dirty="0">
+              <a:solidFill>
+                <a:schemeClr val="accent1"/>
+              </a:solidFill>
+              <a:latin typeface="+mj-lt"/>
+              <a:ea typeface="+mj-ea"/>
+              <a:cs typeface="+mj-cs"/>
+            </a:endParaRPr>
+          </a:p>
+        </p:txBody>
+      </p:sp>
+    </p:spTree>
+    <p:custDataLst>
+      <p:tags r:id="rId1"/>
+    </p:custDataLst>
+    <p:extLst>
+      <p:ext uri="{BB962C8B-B14F-4D97-AF65-F5344CB8AC3E}">
+        <p14:creationId xmlns:p14="http://schemas.microsoft.com/office/powerpoint/2010/main" val="3295894863"/>
+      </p:ext>
+    </p:extLst>
+  </p:cSld>
+  <p:clrMapOvr>
+    <a:masterClrMapping/>
+  </p:clrMapOvr>
+</p:sld>
+</file>
+
+<file path=ppt/slides/slide8.xml><?xml version="1.0" encoding="utf-8"?>
+<p:sld xmlns:a="http://schemas.openxmlformats.org/drawingml/2006/main" xmlns:r="http://schemas.openxmlformats.org/officeDocument/2006/relationships" xmlns:p="http://schemas.openxmlformats.org/presentationml/2006/main">
+  <p:cSld>
+    <p:spTree>
+      <p:nvGrpSpPr>
+        <p:cNvPr id="1" name="">
+          <a:extLst>
+            <a:ext uri="{FF2B5EF4-FFF2-40B4-BE49-F238E27FC236}">
+              <a16:creationId xmlns:a16="http://schemas.microsoft.com/office/drawing/2014/main" id="{72882180-ECD6-8907-93BA-83F63A95EB45}"/>
+            </a:ext>
+          </a:extLst>
+        </p:cNvPr>
+        <p:cNvGrpSpPr/>
+        <p:nvPr/>
+      </p:nvGrpSpPr>
+      <p:grpSpPr>
+        <a:xfrm>
+          <a:off x="0" y="0"/>
+          <a:ext cx="0" cy="0"/>
+          <a:chOff x="0" y="0"/>
+          <a:chExt cx="0" cy="0"/>
+        </a:xfrm>
+      </p:grpSpPr>
+      <p:sp>
+        <p:nvSpPr>
+          <p:cNvPr id="3" name="Titel 2">
+            <a:extLst>
+              <a:ext uri="{FF2B5EF4-FFF2-40B4-BE49-F238E27FC236}">
+                <a16:creationId xmlns:a16="http://schemas.microsoft.com/office/drawing/2014/main" id="{5D298901-9FD3-8835-A20D-C60DA1AF93C4}"/>
+              </a:ext>
+            </a:extLst>
+          </p:cNvPr>
+          <p:cNvSpPr>
+            <a:spLocks noGrp="1"/>
+          </p:cNvSpPr>
+          <p:nvPr>
+            <p:ph type="title"/>
           </p:nvPr>
         </p:nvSpPr>
         <p:spPr/>
@@ -12524,18 +15131,1791 @@
           <a:bodyPr/>
           <a:lstStyle/>
           <a:p>
-            <a:pPr lvl="2">
-              <a:spcBef>
-                <a:spcPts val="0"/>
-              </a:spcBef>
-            </a:pPr>
-            <a:r>
+            <a:r>
+              <a:rPr lang="en-IN" dirty="0"/>
+              <a:t>3x3 neuro-transistor</a:t>
+            </a:r>
+            <a:br>
               <a:rPr lang="en-US" dirty="0"/>
-              <a:t>…</a:t>
-            </a:r>
-          </a:p>
-        </p:txBody>
-      </p:sp>
+            </a:br>
+            <a:endParaRPr lang="en-US" b="0" dirty="0"/>
+          </a:p>
+        </p:txBody>
+      </p:sp>
+      <p:pic>
+        <p:nvPicPr>
+          <p:cNvPr id="5" name="Content Placeholder 4">
+            <a:extLst>
+              <a:ext uri="{FF2B5EF4-FFF2-40B4-BE49-F238E27FC236}">
+                <a16:creationId xmlns:a16="http://schemas.microsoft.com/office/drawing/2014/main" id="{F49166CC-DD5E-7298-9263-105C6D6B9056}"/>
+              </a:ext>
+            </a:extLst>
+          </p:cNvPr>
+          <p:cNvPicPr>
+            <a:picLocks noGrp="1" noChangeAspect="1"/>
+          </p:cNvPicPr>
+          <p:nvPr>
+            <p:ph sz="quarter" idx="10"/>
+          </p:nvPr>
+        </p:nvPicPr>
+        <p:blipFill>
+          <a:blip r:embed="rId3"/>
+          <a:stretch>
+            <a:fillRect/>
+          </a:stretch>
+        </p:blipFill>
+        <p:spPr>
+          <a:xfrm>
+            <a:off x="874712" y="874643"/>
+            <a:ext cx="3657531" cy="4641573"/>
+          </a:xfrm>
+        </p:spPr>
+      </p:pic>
+      <p:graphicFrame>
+        <p:nvGraphicFramePr>
+          <p:cNvPr id="6" name="Table 5">
+            <a:extLst>
+              <a:ext uri="{FF2B5EF4-FFF2-40B4-BE49-F238E27FC236}">
+                <a16:creationId xmlns:a16="http://schemas.microsoft.com/office/drawing/2014/main" id="{A4BD62A1-2550-0CB5-94E7-201557C3148A}"/>
+              </a:ext>
+            </a:extLst>
+          </p:cNvPr>
+          <p:cNvGraphicFramePr>
+            <a:graphicFrameLocks noGrp="1"/>
+          </p:cNvGraphicFramePr>
+          <p:nvPr>
+            <p:extLst>
+              <p:ext uri="{D42A27DB-BD31-4B8C-83A1-F6EECF244321}">
+                <p14:modId xmlns:p14="http://schemas.microsoft.com/office/powerpoint/2010/main" val="3405931782"/>
+              </p:ext>
+            </p:extLst>
+          </p:nvPr>
+        </p:nvGraphicFramePr>
+        <p:xfrm>
+          <a:off x="5373203" y="1232460"/>
+          <a:ext cx="2058573" cy="1112520"/>
+        </p:xfrm>
+        <a:graphic>
+          <a:graphicData uri="http://schemas.openxmlformats.org/drawingml/2006/table">
+            <a:tbl>
+              <a:tblPr firstRow="1" bandRow="1">
+                <a:tableStyleId>{5940675A-B579-460E-94D1-54222C63F5DA}</a:tableStyleId>
+              </a:tblPr>
+              <a:tblGrid>
+                <a:gridCol w="686191">
+                  <a:extLst>
+                    <a:ext uri="{9D8B030D-6E8A-4147-A177-3AD203B41FA5}">
+                      <a16:colId xmlns:a16="http://schemas.microsoft.com/office/drawing/2014/main" val="3521477546"/>
+                    </a:ext>
+                  </a:extLst>
+                </a:gridCol>
+                <a:gridCol w="686191">
+                  <a:extLst>
+                    <a:ext uri="{9D8B030D-6E8A-4147-A177-3AD203B41FA5}">
+                      <a16:colId xmlns:a16="http://schemas.microsoft.com/office/drawing/2014/main" val="854420662"/>
+                    </a:ext>
+                  </a:extLst>
+                </a:gridCol>
+                <a:gridCol w="686191">
+                  <a:extLst>
+                    <a:ext uri="{9D8B030D-6E8A-4147-A177-3AD203B41FA5}">
+                      <a16:colId xmlns:a16="http://schemas.microsoft.com/office/drawing/2014/main" val="530502544"/>
+                    </a:ext>
+                  </a:extLst>
+                </a:gridCol>
+              </a:tblGrid>
+              <a:tr h="370840">
+                <a:tc>
+                  <a:txBody>
+                    <a:bodyPr/>
+                    <a:lstStyle/>
+                    <a:p>
+                      <a:pPr algn="ctr"/>
+                      <a:r>
+                        <a:rPr lang="en-US" sz="1200" b="1" dirty="0">
+                          <a:solidFill>
+                            <a:schemeClr val="bg1"/>
+                          </a:solidFill>
+                        </a:rPr>
+                        <a:t>U1</a:t>
+                      </a:r>
+                      <a:endParaRPr lang="en-IN" sz="1200" b="1" dirty="0">
+                        <a:solidFill>
+                          <a:schemeClr val="bg1"/>
+                        </a:solidFill>
+                      </a:endParaRPr>
+                    </a:p>
+                  </a:txBody>
+                  <a:tcPr anchor="ctr">
+                    <a:solidFill>
+                      <a:schemeClr val="accent4"/>
+                    </a:solidFill>
+                  </a:tcPr>
+                </a:tc>
+                <a:tc>
+                  <a:txBody>
+                    <a:bodyPr/>
+                    <a:lstStyle/>
+                    <a:p>
+                      <a:pPr marL="0" marR="0" lvl="0" indent="0" algn="ctr" defTabSz="914269" rtl="0" eaLnBrk="1" fontAlgn="auto" latinLnBrk="0" hangingPunct="1">
+                        <a:lnSpc>
+                          <a:spcPct val="100000"/>
+                        </a:lnSpc>
+                        <a:spcBef>
+                          <a:spcPts val="0"/>
+                        </a:spcBef>
+                        <a:spcAft>
+                          <a:spcPts val="0"/>
+                        </a:spcAft>
+                        <a:buClrTx/>
+                        <a:buSzTx/>
+                        <a:buFontTx/>
+                        <a:buNone/>
+                        <a:tabLst/>
+                        <a:defRPr/>
+                      </a:pPr>
+                      <a:r>
+                        <a:rPr kumimoji="0" lang="en-US" sz="1200" b="1" i="0" u="none" strike="noStrike" kern="1200" cap="none" spc="0" normalizeH="0" baseline="0" noProof="0" dirty="0">
+                          <a:ln>
+                            <a:noFill/>
+                          </a:ln>
+                          <a:solidFill>
+                            <a:prstClr val="white"/>
+                          </a:solidFill>
+                          <a:effectLst/>
+                          <a:uLnTx/>
+                          <a:uFillTx/>
+                          <a:latin typeface="Open Sans"/>
+                          <a:ea typeface="+mn-ea"/>
+                          <a:cs typeface="+mn-cs"/>
+                        </a:rPr>
+                        <a:t>U4</a:t>
+                      </a:r>
+                      <a:endParaRPr kumimoji="0" lang="en-IN" sz="1200" b="1" i="0" u="none" strike="noStrike" kern="1200" cap="none" spc="0" normalizeH="0" baseline="0" noProof="0" dirty="0">
+                        <a:ln>
+                          <a:noFill/>
+                        </a:ln>
+                        <a:solidFill>
+                          <a:prstClr val="white"/>
+                        </a:solidFill>
+                        <a:effectLst/>
+                        <a:uLnTx/>
+                        <a:uFillTx/>
+                        <a:latin typeface="Open Sans"/>
+                        <a:ea typeface="+mn-ea"/>
+                        <a:cs typeface="+mn-cs"/>
+                      </a:endParaRPr>
+                    </a:p>
+                  </a:txBody>
+                  <a:tcPr anchor="ctr">
+                    <a:solidFill>
+                      <a:srgbClr val="FFC000"/>
+                    </a:solidFill>
+                  </a:tcPr>
+                </a:tc>
+                <a:tc>
+                  <a:txBody>
+                    <a:bodyPr/>
+                    <a:lstStyle/>
+                    <a:p>
+                      <a:pPr marL="0" marR="0" lvl="0" indent="0" algn="ctr" defTabSz="914269" rtl="0" eaLnBrk="1" fontAlgn="auto" latinLnBrk="0" hangingPunct="1">
+                        <a:lnSpc>
+                          <a:spcPct val="100000"/>
+                        </a:lnSpc>
+                        <a:spcBef>
+                          <a:spcPts val="0"/>
+                        </a:spcBef>
+                        <a:spcAft>
+                          <a:spcPts val="0"/>
+                        </a:spcAft>
+                        <a:buClrTx/>
+                        <a:buSzTx/>
+                        <a:buFontTx/>
+                        <a:buNone/>
+                        <a:tabLst/>
+                        <a:defRPr/>
+                      </a:pPr>
+                      <a:r>
+                        <a:rPr kumimoji="0" lang="en-US" sz="1200" b="1" i="0" u="none" strike="noStrike" kern="1200" cap="none" spc="0" normalizeH="0" baseline="0" noProof="0" dirty="0">
+                          <a:ln>
+                            <a:noFill/>
+                          </a:ln>
+                          <a:solidFill>
+                            <a:prstClr val="white"/>
+                          </a:solidFill>
+                          <a:effectLst/>
+                          <a:uLnTx/>
+                          <a:uFillTx/>
+                          <a:latin typeface="Open Sans"/>
+                          <a:ea typeface="+mn-ea"/>
+                          <a:cs typeface="+mn-cs"/>
+                        </a:rPr>
+                        <a:t>U7</a:t>
+                      </a:r>
+                      <a:endParaRPr kumimoji="0" lang="en-IN" sz="1200" b="1" i="0" u="none" strike="noStrike" kern="1200" cap="none" spc="0" normalizeH="0" baseline="0" noProof="0" dirty="0">
+                        <a:ln>
+                          <a:noFill/>
+                        </a:ln>
+                        <a:solidFill>
+                          <a:prstClr val="white"/>
+                        </a:solidFill>
+                        <a:effectLst/>
+                        <a:uLnTx/>
+                        <a:uFillTx/>
+                        <a:latin typeface="Open Sans"/>
+                        <a:ea typeface="+mn-ea"/>
+                        <a:cs typeface="+mn-cs"/>
+                      </a:endParaRPr>
+                    </a:p>
+                  </a:txBody>
+                  <a:tcPr anchor="ctr">
+                    <a:solidFill>
+                      <a:srgbClr val="FF0000"/>
+                    </a:solidFill>
+                  </a:tcPr>
+                </a:tc>
+                <a:extLst>
+                  <a:ext uri="{0D108BD9-81ED-4DB2-BD59-A6C34878D82A}">
+                    <a16:rowId xmlns:a16="http://schemas.microsoft.com/office/drawing/2014/main" val="3189296442"/>
+                  </a:ext>
+                </a:extLst>
+              </a:tr>
+              <a:tr h="370840">
+                <a:tc>
+                  <a:txBody>
+                    <a:bodyPr/>
+                    <a:lstStyle/>
+                    <a:p>
+                      <a:pPr marL="0" marR="0" lvl="0" indent="0" algn="ctr" defTabSz="914269" rtl="0" eaLnBrk="1" fontAlgn="auto" latinLnBrk="0" hangingPunct="1">
+                        <a:lnSpc>
+                          <a:spcPct val="100000"/>
+                        </a:lnSpc>
+                        <a:spcBef>
+                          <a:spcPts val="0"/>
+                        </a:spcBef>
+                        <a:spcAft>
+                          <a:spcPts val="0"/>
+                        </a:spcAft>
+                        <a:buClrTx/>
+                        <a:buSzTx/>
+                        <a:buFontTx/>
+                        <a:buNone/>
+                        <a:tabLst/>
+                        <a:defRPr/>
+                      </a:pPr>
+                      <a:r>
+                        <a:rPr kumimoji="0" lang="en-US" sz="1200" b="1" i="0" u="none" strike="noStrike" kern="1200" cap="none" spc="0" normalizeH="0" baseline="0" noProof="0" dirty="0">
+                          <a:ln>
+                            <a:noFill/>
+                          </a:ln>
+                          <a:solidFill>
+                            <a:prstClr val="white"/>
+                          </a:solidFill>
+                          <a:effectLst/>
+                          <a:uLnTx/>
+                          <a:uFillTx/>
+                          <a:latin typeface="+mn-lt"/>
+                          <a:ea typeface="+mn-ea"/>
+                          <a:cs typeface="+mn-cs"/>
+                        </a:rPr>
+                        <a:t>U2</a:t>
+                      </a:r>
+                      <a:endParaRPr kumimoji="0" lang="en-IN" sz="1200" b="1" i="0" u="none" strike="noStrike" kern="1200" cap="none" spc="0" normalizeH="0" baseline="0" noProof="0" dirty="0">
+                        <a:ln>
+                          <a:noFill/>
+                        </a:ln>
+                        <a:solidFill>
+                          <a:prstClr val="white"/>
+                        </a:solidFill>
+                        <a:effectLst/>
+                        <a:uLnTx/>
+                        <a:uFillTx/>
+                        <a:latin typeface="+mn-lt"/>
+                        <a:ea typeface="+mn-ea"/>
+                        <a:cs typeface="+mn-cs"/>
+                      </a:endParaRPr>
+                    </a:p>
+                  </a:txBody>
+                  <a:tcPr anchor="ctr">
+                    <a:solidFill>
+                      <a:schemeClr val="accent4"/>
+                    </a:solidFill>
+                  </a:tcPr>
+                </a:tc>
+                <a:tc>
+                  <a:txBody>
+                    <a:bodyPr/>
+                    <a:lstStyle/>
+                    <a:p>
+                      <a:pPr marL="0" marR="0" lvl="0" indent="0" algn="ctr" defTabSz="914269" rtl="0" eaLnBrk="1" fontAlgn="auto" latinLnBrk="0" hangingPunct="1">
+                        <a:lnSpc>
+                          <a:spcPct val="100000"/>
+                        </a:lnSpc>
+                        <a:spcBef>
+                          <a:spcPts val="0"/>
+                        </a:spcBef>
+                        <a:spcAft>
+                          <a:spcPts val="0"/>
+                        </a:spcAft>
+                        <a:buClrTx/>
+                        <a:buSzTx/>
+                        <a:buFontTx/>
+                        <a:buNone/>
+                        <a:tabLst/>
+                        <a:defRPr/>
+                      </a:pPr>
+                      <a:r>
+                        <a:rPr kumimoji="0" lang="en-US" sz="1200" b="1" i="0" u="none" strike="noStrike" kern="1200" cap="none" spc="0" normalizeH="0" baseline="0" noProof="0" dirty="0">
+                          <a:ln>
+                            <a:noFill/>
+                          </a:ln>
+                          <a:solidFill>
+                            <a:prstClr val="white"/>
+                          </a:solidFill>
+                          <a:effectLst/>
+                          <a:uLnTx/>
+                          <a:uFillTx/>
+                          <a:latin typeface="Open Sans"/>
+                          <a:ea typeface="+mn-ea"/>
+                          <a:cs typeface="+mn-cs"/>
+                        </a:rPr>
+                        <a:t>U5</a:t>
+                      </a:r>
+                      <a:endParaRPr kumimoji="0" lang="en-IN" sz="1200" b="1" i="0" u="none" strike="noStrike" kern="1200" cap="none" spc="0" normalizeH="0" baseline="0" noProof="0" dirty="0">
+                        <a:ln>
+                          <a:noFill/>
+                        </a:ln>
+                        <a:solidFill>
+                          <a:prstClr val="white"/>
+                        </a:solidFill>
+                        <a:effectLst/>
+                        <a:uLnTx/>
+                        <a:uFillTx/>
+                        <a:latin typeface="Open Sans"/>
+                        <a:ea typeface="+mn-ea"/>
+                        <a:cs typeface="+mn-cs"/>
+                      </a:endParaRPr>
+                    </a:p>
+                  </a:txBody>
+                  <a:tcPr anchor="ctr">
+                    <a:solidFill>
+                      <a:srgbClr val="FFC000"/>
+                    </a:solidFill>
+                  </a:tcPr>
+                </a:tc>
+                <a:tc>
+                  <a:txBody>
+                    <a:bodyPr/>
+                    <a:lstStyle/>
+                    <a:p>
+                      <a:pPr marL="0" marR="0" lvl="0" indent="0" algn="ctr" defTabSz="914269" rtl="0" eaLnBrk="1" fontAlgn="auto" latinLnBrk="0" hangingPunct="1">
+                        <a:lnSpc>
+                          <a:spcPct val="100000"/>
+                        </a:lnSpc>
+                        <a:spcBef>
+                          <a:spcPts val="0"/>
+                        </a:spcBef>
+                        <a:spcAft>
+                          <a:spcPts val="0"/>
+                        </a:spcAft>
+                        <a:buClrTx/>
+                        <a:buSzTx/>
+                        <a:buFontTx/>
+                        <a:buNone/>
+                        <a:tabLst/>
+                        <a:defRPr/>
+                      </a:pPr>
+                      <a:r>
+                        <a:rPr kumimoji="0" lang="en-US" sz="1200" b="1" i="0" u="none" strike="noStrike" kern="1200" cap="none" spc="0" normalizeH="0" baseline="0" noProof="0" dirty="0">
+                          <a:ln>
+                            <a:noFill/>
+                          </a:ln>
+                          <a:solidFill>
+                            <a:prstClr val="white"/>
+                          </a:solidFill>
+                          <a:effectLst/>
+                          <a:uLnTx/>
+                          <a:uFillTx/>
+                          <a:latin typeface="Open Sans"/>
+                          <a:ea typeface="+mn-ea"/>
+                          <a:cs typeface="+mn-cs"/>
+                        </a:rPr>
+                        <a:t>U8</a:t>
+                      </a:r>
+                      <a:endParaRPr kumimoji="0" lang="en-IN" sz="1200" b="1" i="0" u="none" strike="noStrike" kern="1200" cap="none" spc="0" normalizeH="0" baseline="0" noProof="0" dirty="0">
+                        <a:ln>
+                          <a:noFill/>
+                        </a:ln>
+                        <a:solidFill>
+                          <a:prstClr val="white"/>
+                        </a:solidFill>
+                        <a:effectLst/>
+                        <a:uLnTx/>
+                        <a:uFillTx/>
+                        <a:latin typeface="Open Sans"/>
+                        <a:ea typeface="+mn-ea"/>
+                        <a:cs typeface="+mn-cs"/>
+                      </a:endParaRPr>
+                    </a:p>
+                  </a:txBody>
+                  <a:tcPr anchor="ctr">
+                    <a:solidFill>
+                      <a:srgbClr val="FF0000"/>
+                    </a:solidFill>
+                  </a:tcPr>
+                </a:tc>
+                <a:extLst>
+                  <a:ext uri="{0D108BD9-81ED-4DB2-BD59-A6C34878D82A}">
+                    <a16:rowId xmlns:a16="http://schemas.microsoft.com/office/drawing/2014/main" val="500930785"/>
+                  </a:ext>
+                </a:extLst>
+              </a:tr>
+              <a:tr h="370840">
+                <a:tc>
+                  <a:txBody>
+                    <a:bodyPr/>
+                    <a:lstStyle/>
+                    <a:p>
+                      <a:pPr marL="0" marR="0" lvl="0" indent="0" algn="ctr" defTabSz="914269" rtl="0" eaLnBrk="1" fontAlgn="auto" latinLnBrk="0" hangingPunct="1">
+                        <a:lnSpc>
+                          <a:spcPct val="100000"/>
+                        </a:lnSpc>
+                        <a:spcBef>
+                          <a:spcPts val="0"/>
+                        </a:spcBef>
+                        <a:spcAft>
+                          <a:spcPts val="0"/>
+                        </a:spcAft>
+                        <a:buClrTx/>
+                        <a:buSzTx/>
+                        <a:buFontTx/>
+                        <a:buNone/>
+                        <a:tabLst/>
+                        <a:defRPr/>
+                      </a:pPr>
+                      <a:r>
+                        <a:rPr kumimoji="0" lang="en-US" sz="1200" b="1" i="0" u="none" strike="noStrike" kern="1200" cap="none" spc="0" normalizeH="0" baseline="0" noProof="0" dirty="0">
+                          <a:ln>
+                            <a:noFill/>
+                          </a:ln>
+                          <a:solidFill>
+                            <a:prstClr val="white"/>
+                          </a:solidFill>
+                          <a:effectLst/>
+                          <a:uLnTx/>
+                          <a:uFillTx/>
+                          <a:latin typeface="+mn-lt"/>
+                          <a:ea typeface="+mn-ea"/>
+                          <a:cs typeface="+mn-cs"/>
+                        </a:rPr>
+                        <a:t>U3</a:t>
+                      </a:r>
+                      <a:endParaRPr kumimoji="0" lang="en-IN" sz="1200" b="1" i="0" u="none" strike="noStrike" kern="1200" cap="none" spc="0" normalizeH="0" baseline="0" noProof="0" dirty="0">
+                        <a:ln>
+                          <a:noFill/>
+                        </a:ln>
+                        <a:solidFill>
+                          <a:prstClr val="white"/>
+                        </a:solidFill>
+                        <a:effectLst/>
+                        <a:uLnTx/>
+                        <a:uFillTx/>
+                        <a:latin typeface="+mn-lt"/>
+                        <a:ea typeface="+mn-ea"/>
+                        <a:cs typeface="+mn-cs"/>
+                      </a:endParaRPr>
+                    </a:p>
+                  </a:txBody>
+                  <a:tcPr anchor="ctr">
+                    <a:solidFill>
+                      <a:schemeClr val="accent4"/>
+                    </a:solidFill>
+                  </a:tcPr>
+                </a:tc>
+                <a:tc>
+                  <a:txBody>
+                    <a:bodyPr/>
+                    <a:lstStyle/>
+                    <a:p>
+                      <a:pPr marL="0" marR="0" lvl="0" indent="0" algn="ctr" defTabSz="914269" rtl="0" eaLnBrk="1" fontAlgn="auto" latinLnBrk="0" hangingPunct="1">
+                        <a:lnSpc>
+                          <a:spcPct val="100000"/>
+                        </a:lnSpc>
+                        <a:spcBef>
+                          <a:spcPts val="0"/>
+                        </a:spcBef>
+                        <a:spcAft>
+                          <a:spcPts val="0"/>
+                        </a:spcAft>
+                        <a:buClrTx/>
+                        <a:buSzTx/>
+                        <a:buFontTx/>
+                        <a:buNone/>
+                        <a:tabLst/>
+                        <a:defRPr/>
+                      </a:pPr>
+                      <a:r>
+                        <a:rPr kumimoji="0" lang="en-US" sz="1200" b="1" i="0" u="none" strike="noStrike" kern="1200" cap="none" spc="0" normalizeH="0" baseline="0" noProof="0" dirty="0">
+                          <a:ln>
+                            <a:noFill/>
+                          </a:ln>
+                          <a:solidFill>
+                            <a:prstClr val="white"/>
+                          </a:solidFill>
+                          <a:effectLst/>
+                          <a:uLnTx/>
+                          <a:uFillTx/>
+                          <a:latin typeface="Open Sans"/>
+                          <a:ea typeface="+mn-ea"/>
+                          <a:cs typeface="+mn-cs"/>
+                        </a:rPr>
+                        <a:t>U6</a:t>
+                      </a:r>
+                      <a:endParaRPr kumimoji="0" lang="en-IN" sz="1200" b="1" i="0" u="none" strike="noStrike" kern="1200" cap="none" spc="0" normalizeH="0" baseline="0" noProof="0" dirty="0">
+                        <a:ln>
+                          <a:noFill/>
+                        </a:ln>
+                        <a:solidFill>
+                          <a:prstClr val="white"/>
+                        </a:solidFill>
+                        <a:effectLst/>
+                        <a:uLnTx/>
+                        <a:uFillTx/>
+                        <a:latin typeface="Open Sans"/>
+                        <a:ea typeface="+mn-ea"/>
+                        <a:cs typeface="+mn-cs"/>
+                      </a:endParaRPr>
+                    </a:p>
+                  </a:txBody>
+                  <a:tcPr anchor="ctr">
+                    <a:solidFill>
+                      <a:srgbClr val="FFC000"/>
+                    </a:solidFill>
+                  </a:tcPr>
+                </a:tc>
+                <a:tc>
+                  <a:txBody>
+                    <a:bodyPr/>
+                    <a:lstStyle/>
+                    <a:p>
+                      <a:pPr marL="0" marR="0" lvl="0" indent="0" algn="ctr" defTabSz="914269" rtl="0" eaLnBrk="1" fontAlgn="auto" latinLnBrk="0" hangingPunct="1">
+                        <a:lnSpc>
+                          <a:spcPct val="100000"/>
+                        </a:lnSpc>
+                        <a:spcBef>
+                          <a:spcPts val="0"/>
+                        </a:spcBef>
+                        <a:spcAft>
+                          <a:spcPts val="0"/>
+                        </a:spcAft>
+                        <a:buClrTx/>
+                        <a:buSzTx/>
+                        <a:buFontTx/>
+                        <a:buNone/>
+                        <a:tabLst/>
+                        <a:defRPr/>
+                      </a:pPr>
+                      <a:r>
+                        <a:rPr kumimoji="0" lang="en-US" sz="1200" b="1" i="0" u="none" strike="noStrike" kern="1200" cap="none" spc="0" normalizeH="0" baseline="0" noProof="0" dirty="0">
+                          <a:ln>
+                            <a:noFill/>
+                          </a:ln>
+                          <a:solidFill>
+                            <a:prstClr val="white"/>
+                          </a:solidFill>
+                          <a:effectLst/>
+                          <a:uLnTx/>
+                          <a:uFillTx/>
+                          <a:latin typeface="Open Sans"/>
+                          <a:ea typeface="+mn-ea"/>
+                          <a:cs typeface="+mn-cs"/>
+                        </a:rPr>
+                        <a:t>U9</a:t>
+                      </a:r>
+                      <a:endParaRPr kumimoji="0" lang="en-IN" sz="1200" b="1" i="0" u="none" strike="noStrike" kern="1200" cap="none" spc="0" normalizeH="0" baseline="0" noProof="0" dirty="0">
+                        <a:ln>
+                          <a:noFill/>
+                        </a:ln>
+                        <a:solidFill>
+                          <a:prstClr val="white"/>
+                        </a:solidFill>
+                        <a:effectLst/>
+                        <a:uLnTx/>
+                        <a:uFillTx/>
+                        <a:latin typeface="Open Sans"/>
+                        <a:ea typeface="+mn-ea"/>
+                        <a:cs typeface="+mn-cs"/>
+                      </a:endParaRPr>
+                    </a:p>
+                  </a:txBody>
+                  <a:tcPr anchor="ctr">
+                    <a:solidFill>
+                      <a:srgbClr val="FF0000"/>
+                    </a:solidFill>
+                  </a:tcPr>
+                </a:tc>
+                <a:extLst>
+                  <a:ext uri="{0D108BD9-81ED-4DB2-BD59-A6C34878D82A}">
+                    <a16:rowId xmlns:a16="http://schemas.microsoft.com/office/drawing/2014/main" val="1178865150"/>
+                  </a:ext>
+                </a:extLst>
+              </a:tr>
+            </a:tbl>
+          </a:graphicData>
+        </a:graphic>
+      </p:graphicFrame>
+      <p:pic>
+        <p:nvPicPr>
+          <p:cNvPr id="9" name="Picture 8">
+            <a:extLst>
+              <a:ext uri="{FF2B5EF4-FFF2-40B4-BE49-F238E27FC236}">
+                <a16:creationId xmlns:a16="http://schemas.microsoft.com/office/drawing/2014/main" id="{6A0ECB14-D12C-DD0B-9F27-C26485549BAC}"/>
+              </a:ext>
+            </a:extLst>
+          </p:cNvPr>
+          <p:cNvPicPr>
+            <a:picLocks noChangeAspect="1"/>
+          </p:cNvPicPr>
+          <p:nvPr/>
+        </p:nvPicPr>
+        <p:blipFill>
+          <a:blip r:embed="rId4" cstate="print">
+            <a:extLst>
+              <a:ext uri="{28A0092B-C50C-407E-A947-70E740481C1C}">
+                <a14:useLocalDpi xmlns:a14="http://schemas.microsoft.com/office/drawing/2010/main" val="0"/>
+              </a:ext>
+            </a:extLst>
+          </a:blip>
+          <a:stretch>
+            <a:fillRect/>
+          </a:stretch>
+        </p:blipFill>
+        <p:spPr>
+          <a:xfrm>
+            <a:off x="4704589" y="2567022"/>
+            <a:ext cx="3395802" cy="2739673"/>
+          </a:xfrm>
+          <a:prstGeom prst="rect">
+            <a:avLst/>
+          </a:prstGeom>
+        </p:spPr>
+      </p:pic>
+      <p:graphicFrame>
+        <p:nvGraphicFramePr>
+          <p:cNvPr id="10" name="Table 9">
+            <a:extLst>
+              <a:ext uri="{FF2B5EF4-FFF2-40B4-BE49-F238E27FC236}">
+                <a16:creationId xmlns:a16="http://schemas.microsoft.com/office/drawing/2014/main" id="{B4A309CC-FAF0-7E9E-DF7D-C9EBCAAEBC79}"/>
+              </a:ext>
+            </a:extLst>
+          </p:cNvPr>
+          <p:cNvGraphicFramePr>
+            <a:graphicFrameLocks noGrp="1"/>
+          </p:cNvGraphicFramePr>
+          <p:nvPr>
+            <p:extLst>
+              <p:ext uri="{D42A27DB-BD31-4B8C-83A1-F6EECF244321}">
+                <p14:modId xmlns:p14="http://schemas.microsoft.com/office/powerpoint/2010/main" val="925969335"/>
+              </p:ext>
+            </p:extLst>
+          </p:nvPr>
+        </p:nvGraphicFramePr>
+        <p:xfrm>
+          <a:off x="8995486" y="1232460"/>
+          <a:ext cx="2058573" cy="1112520"/>
+        </p:xfrm>
+        <a:graphic>
+          <a:graphicData uri="http://schemas.openxmlformats.org/drawingml/2006/table">
+            <a:tbl>
+              <a:tblPr firstRow="1" bandRow="1">
+                <a:tableStyleId>{5940675A-B579-460E-94D1-54222C63F5DA}</a:tableStyleId>
+              </a:tblPr>
+              <a:tblGrid>
+                <a:gridCol w="686191">
+                  <a:extLst>
+                    <a:ext uri="{9D8B030D-6E8A-4147-A177-3AD203B41FA5}">
+                      <a16:colId xmlns:a16="http://schemas.microsoft.com/office/drawing/2014/main" val="3521477546"/>
+                    </a:ext>
+                  </a:extLst>
+                </a:gridCol>
+                <a:gridCol w="686191">
+                  <a:extLst>
+                    <a:ext uri="{9D8B030D-6E8A-4147-A177-3AD203B41FA5}">
+                      <a16:colId xmlns:a16="http://schemas.microsoft.com/office/drawing/2014/main" val="854420662"/>
+                    </a:ext>
+                  </a:extLst>
+                </a:gridCol>
+                <a:gridCol w="686191">
+                  <a:extLst>
+                    <a:ext uri="{9D8B030D-6E8A-4147-A177-3AD203B41FA5}">
+                      <a16:colId xmlns:a16="http://schemas.microsoft.com/office/drawing/2014/main" val="530502544"/>
+                    </a:ext>
+                  </a:extLst>
+                </a:gridCol>
+              </a:tblGrid>
+              <a:tr h="370840">
+                <a:tc>
+                  <a:txBody>
+                    <a:bodyPr/>
+                    <a:lstStyle/>
+                    <a:p>
+                      <a:pPr algn="ctr"/>
+                      <a:r>
+                        <a:rPr lang="en-US" sz="1200" b="1" dirty="0">
+                          <a:solidFill>
+                            <a:schemeClr val="bg1"/>
+                          </a:solidFill>
+                        </a:rPr>
+                        <a:t>U1</a:t>
+                      </a:r>
+                      <a:endParaRPr lang="en-IN" sz="1200" b="1" dirty="0">
+                        <a:solidFill>
+                          <a:schemeClr val="bg1"/>
+                        </a:solidFill>
+                      </a:endParaRPr>
+                    </a:p>
+                  </a:txBody>
+                  <a:tcPr anchor="ctr">
+                    <a:solidFill>
+                      <a:schemeClr val="accent4"/>
+                    </a:solidFill>
+                  </a:tcPr>
+                </a:tc>
+                <a:tc>
+                  <a:txBody>
+                    <a:bodyPr/>
+                    <a:lstStyle/>
+                    <a:p>
+                      <a:pPr marL="0" marR="0" lvl="0" indent="0" algn="ctr" defTabSz="914269" rtl="0" eaLnBrk="1" fontAlgn="auto" latinLnBrk="0" hangingPunct="1">
+                        <a:lnSpc>
+                          <a:spcPct val="100000"/>
+                        </a:lnSpc>
+                        <a:spcBef>
+                          <a:spcPts val="0"/>
+                        </a:spcBef>
+                        <a:spcAft>
+                          <a:spcPts val="0"/>
+                        </a:spcAft>
+                        <a:buClrTx/>
+                        <a:buSzTx/>
+                        <a:buFontTx/>
+                        <a:buNone/>
+                        <a:tabLst/>
+                        <a:defRPr/>
+                      </a:pPr>
+                      <a:r>
+                        <a:rPr kumimoji="0" lang="en-US" sz="1200" b="1" i="0" u="none" strike="noStrike" kern="1200" cap="none" spc="0" normalizeH="0" baseline="0" noProof="0" dirty="0">
+                          <a:ln>
+                            <a:noFill/>
+                          </a:ln>
+                          <a:solidFill>
+                            <a:prstClr val="white"/>
+                          </a:solidFill>
+                          <a:effectLst/>
+                          <a:uLnTx/>
+                          <a:uFillTx/>
+                          <a:latin typeface="Open Sans"/>
+                          <a:ea typeface="+mn-ea"/>
+                          <a:cs typeface="+mn-cs"/>
+                        </a:rPr>
+                        <a:t>U4</a:t>
+                      </a:r>
+                      <a:endParaRPr kumimoji="0" lang="en-IN" sz="1200" b="1" i="0" u="none" strike="noStrike" kern="1200" cap="none" spc="0" normalizeH="0" baseline="0" noProof="0" dirty="0">
+                        <a:ln>
+                          <a:noFill/>
+                        </a:ln>
+                        <a:solidFill>
+                          <a:prstClr val="white"/>
+                        </a:solidFill>
+                        <a:effectLst/>
+                        <a:uLnTx/>
+                        <a:uFillTx/>
+                        <a:latin typeface="Open Sans"/>
+                        <a:ea typeface="+mn-ea"/>
+                        <a:cs typeface="+mn-cs"/>
+                      </a:endParaRPr>
+                    </a:p>
+                  </a:txBody>
+                  <a:tcPr anchor="ctr">
+                    <a:solidFill>
+                      <a:schemeClr val="accent4"/>
+                    </a:solidFill>
+                  </a:tcPr>
+                </a:tc>
+                <a:tc>
+                  <a:txBody>
+                    <a:bodyPr/>
+                    <a:lstStyle/>
+                    <a:p>
+                      <a:pPr marL="0" marR="0" lvl="0" indent="0" algn="ctr" defTabSz="914269" rtl="0" eaLnBrk="1" fontAlgn="auto" latinLnBrk="0" hangingPunct="1">
+                        <a:lnSpc>
+                          <a:spcPct val="100000"/>
+                        </a:lnSpc>
+                        <a:spcBef>
+                          <a:spcPts val="0"/>
+                        </a:spcBef>
+                        <a:spcAft>
+                          <a:spcPts val="0"/>
+                        </a:spcAft>
+                        <a:buClrTx/>
+                        <a:buSzTx/>
+                        <a:buFontTx/>
+                        <a:buNone/>
+                        <a:tabLst/>
+                        <a:defRPr/>
+                      </a:pPr>
+                      <a:r>
+                        <a:rPr kumimoji="0" lang="en-US" sz="1200" b="1" i="0" u="none" strike="noStrike" kern="1200" cap="none" spc="0" normalizeH="0" baseline="0" noProof="0" dirty="0">
+                          <a:ln>
+                            <a:noFill/>
+                          </a:ln>
+                          <a:solidFill>
+                            <a:prstClr val="white"/>
+                          </a:solidFill>
+                          <a:effectLst/>
+                          <a:uLnTx/>
+                          <a:uFillTx/>
+                          <a:latin typeface="Open Sans"/>
+                          <a:ea typeface="+mn-ea"/>
+                          <a:cs typeface="+mn-cs"/>
+                        </a:rPr>
+                        <a:t>U7</a:t>
+                      </a:r>
+                      <a:endParaRPr kumimoji="0" lang="en-IN" sz="1200" b="1" i="0" u="none" strike="noStrike" kern="1200" cap="none" spc="0" normalizeH="0" baseline="0" noProof="0" dirty="0">
+                        <a:ln>
+                          <a:noFill/>
+                        </a:ln>
+                        <a:solidFill>
+                          <a:prstClr val="white"/>
+                        </a:solidFill>
+                        <a:effectLst/>
+                        <a:uLnTx/>
+                        <a:uFillTx/>
+                        <a:latin typeface="Open Sans"/>
+                        <a:ea typeface="+mn-ea"/>
+                        <a:cs typeface="+mn-cs"/>
+                      </a:endParaRPr>
+                    </a:p>
+                  </a:txBody>
+                  <a:tcPr anchor="ctr">
+                    <a:solidFill>
+                      <a:schemeClr val="accent4"/>
+                    </a:solidFill>
+                  </a:tcPr>
+                </a:tc>
+                <a:extLst>
+                  <a:ext uri="{0D108BD9-81ED-4DB2-BD59-A6C34878D82A}">
+                    <a16:rowId xmlns:a16="http://schemas.microsoft.com/office/drawing/2014/main" val="3189296442"/>
+                  </a:ext>
+                </a:extLst>
+              </a:tr>
+              <a:tr h="370840">
+                <a:tc>
+                  <a:txBody>
+                    <a:bodyPr/>
+                    <a:lstStyle/>
+                    <a:p>
+                      <a:pPr marL="0" marR="0" lvl="0" indent="0" algn="ctr" defTabSz="914269" rtl="0" eaLnBrk="1" fontAlgn="auto" latinLnBrk="0" hangingPunct="1">
+                        <a:lnSpc>
+                          <a:spcPct val="100000"/>
+                        </a:lnSpc>
+                        <a:spcBef>
+                          <a:spcPts val="0"/>
+                        </a:spcBef>
+                        <a:spcAft>
+                          <a:spcPts val="0"/>
+                        </a:spcAft>
+                        <a:buClrTx/>
+                        <a:buSzTx/>
+                        <a:buFontTx/>
+                        <a:buNone/>
+                        <a:tabLst/>
+                        <a:defRPr/>
+                      </a:pPr>
+                      <a:r>
+                        <a:rPr kumimoji="0" lang="en-US" sz="1200" b="1" i="0" u="none" strike="noStrike" kern="1200" cap="none" spc="0" normalizeH="0" baseline="0" noProof="0" dirty="0">
+                          <a:ln>
+                            <a:noFill/>
+                          </a:ln>
+                          <a:solidFill>
+                            <a:prstClr val="white"/>
+                          </a:solidFill>
+                          <a:effectLst/>
+                          <a:uLnTx/>
+                          <a:uFillTx/>
+                          <a:latin typeface="+mn-lt"/>
+                          <a:ea typeface="+mn-ea"/>
+                          <a:cs typeface="+mn-cs"/>
+                        </a:rPr>
+                        <a:t>U2</a:t>
+                      </a:r>
+                      <a:endParaRPr kumimoji="0" lang="en-IN" sz="1200" b="1" i="0" u="none" strike="noStrike" kern="1200" cap="none" spc="0" normalizeH="0" baseline="0" noProof="0" dirty="0">
+                        <a:ln>
+                          <a:noFill/>
+                        </a:ln>
+                        <a:solidFill>
+                          <a:prstClr val="white"/>
+                        </a:solidFill>
+                        <a:effectLst/>
+                        <a:uLnTx/>
+                        <a:uFillTx/>
+                        <a:latin typeface="+mn-lt"/>
+                        <a:ea typeface="+mn-ea"/>
+                        <a:cs typeface="+mn-cs"/>
+                      </a:endParaRPr>
+                    </a:p>
+                  </a:txBody>
+                  <a:tcPr anchor="ctr">
+                    <a:solidFill>
+                      <a:srgbClr val="FFC000"/>
+                    </a:solidFill>
+                  </a:tcPr>
+                </a:tc>
+                <a:tc>
+                  <a:txBody>
+                    <a:bodyPr/>
+                    <a:lstStyle/>
+                    <a:p>
+                      <a:pPr marL="0" marR="0" lvl="0" indent="0" algn="ctr" defTabSz="914269" rtl="0" eaLnBrk="1" fontAlgn="auto" latinLnBrk="0" hangingPunct="1">
+                        <a:lnSpc>
+                          <a:spcPct val="100000"/>
+                        </a:lnSpc>
+                        <a:spcBef>
+                          <a:spcPts val="0"/>
+                        </a:spcBef>
+                        <a:spcAft>
+                          <a:spcPts val="0"/>
+                        </a:spcAft>
+                        <a:buClrTx/>
+                        <a:buSzTx/>
+                        <a:buFontTx/>
+                        <a:buNone/>
+                        <a:tabLst/>
+                        <a:defRPr/>
+                      </a:pPr>
+                      <a:r>
+                        <a:rPr kumimoji="0" lang="en-US" sz="1200" b="1" i="0" u="none" strike="noStrike" kern="1200" cap="none" spc="0" normalizeH="0" baseline="0" noProof="0" dirty="0">
+                          <a:ln>
+                            <a:noFill/>
+                          </a:ln>
+                          <a:solidFill>
+                            <a:prstClr val="white"/>
+                          </a:solidFill>
+                          <a:effectLst/>
+                          <a:uLnTx/>
+                          <a:uFillTx/>
+                          <a:latin typeface="Open Sans"/>
+                          <a:ea typeface="+mn-ea"/>
+                          <a:cs typeface="+mn-cs"/>
+                        </a:rPr>
+                        <a:t>U5</a:t>
+                      </a:r>
+                      <a:endParaRPr kumimoji="0" lang="en-IN" sz="1200" b="1" i="0" u="none" strike="noStrike" kern="1200" cap="none" spc="0" normalizeH="0" baseline="0" noProof="0" dirty="0">
+                        <a:ln>
+                          <a:noFill/>
+                        </a:ln>
+                        <a:solidFill>
+                          <a:prstClr val="white"/>
+                        </a:solidFill>
+                        <a:effectLst/>
+                        <a:uLnTx/>
+                        <a:uFillTx/>
+                        <a:latin typeface="Open Sans"/>
+                        <a:ea typeface="+mn-ea"/>
+                        <a:cs typeface="+mn-cs"/>
+                      </a:endParaRPr>
+                    </a:p>
+                  </a:txBody>
+                  <a:tcPr anchor="ctr">
+                    <a:solidFill>
+                      <a:srgbClr val="FFC000"/>
+                    </a:solidFill>
+                  </a:tcPr>
+                </a:tc>
+                <a:tc>
+                  <a:txBody>
+                    <a:bodyPr/>
+                    <a:lstStyle/>
+                    <a:p>
+                      <a:pPr marL="0" marR="0" lvl="0" indent="0" algn="ctr" defTabSz="914269" rtl="0" eaLnBrk="1" fontAlgn="auto" latinLnBrk="0" hangingPunct="1">
+                        <a:lnSpc>
+                          <a:spcPct val="100000"/>
+                        </a:lnSpc>
+                        <a:spcBef>
+                          <a:spcPts val="0"/>
+                        </a:spcBef>
+                        <a:spcAft>
+                          <a:spcPts val="0"/>
+                        </a:spcAft>
+                        <a:buClrTx/>
+                        <a:buSzTx/>
+                        <a:buFontTx/>
+                        <a:buNone/>
+                        <a:tabLst/>
+                        <a:defRPr/>
+                      </a:pPr>
+                      <a:r>
+                        <a:rPr kumimoji="0" lang="en-US" sz="1200" b="1" i="0" u="none" strike="noStrike" kern="1200" cap="none" spc="0" normalizeH="0" baseline="0" noProof="0" dirty="0">
+                          <a:ln>
+                            <a:noFill/>
+                          </a:ln>
+                          <a:solidFill>
+                            <a:prstClr val="white"/>
+                          </a:solidFill>
+                          <a:effectLst/>
+                          <a:uLnTx/>
+                          <a:uFillTx/>
+                          <a:latin typeface="Open Sans"/>
+                          <a:ea typeface="+mn-ea"/>
+                          <a:cs typeface="+mn-cs"/>
+                        </a:rPr>
+                        <a:t>U8</a:t>
+                      </a:r>
+                      <a:endParaRPr kumimoji="0" lang="en-IN" sz="1200" b="1" i="0" u="none" strike="noStrike" kern="1200" cap="none" spc="0" normalizeH="0" baseline="0" noProof="0" dirty="0">
+                        <a:ln>
+                          <a:noFill/>
+                        </a:ln>
+                        <a:solidFill>
+                          <a:prstClr val="white"/>
+                        </a:solidFill>
+                        <a:effectLst/>
+                        <a:uLnTx/>
+                        <a:uFillTx/>
+                        <a:latin typeface="Open Sans"/>
+                        <a:ea typeface="+mn-ea"/>
+                        <a:cs typeface="+mn-cs"/>
+                      </a:endParaRPr>
+                    </a:p>
+                  </a:txBody>
+                  <a:tcPr anchor="ctr">
+                    <a:solidFill>
+                      <a:srgbClr val="FFC000"/>
+                    </a:solidFill>
+                  </a:tcPr>
+                </a:tc>
+                <a:extLst>
+                  <a:ext uri="{0D108BD9-81ED-4DB2-BD59-A6C34878D82A}">
+                    <a16:rowId xmlns:a16="http://schemas.microsoft.com/office/drawing/2014/main" val="500930785"/>
+                  </a:ext>
+                </a:extLst>
+              </a:tr>
+              <a:tr h="370840">
+                <a:tc>
+                  <a:txBody>
+                    <a:bodyPr/>
+                    <a:lstStyle/>
+                    <a:p>
+                      <a:pPr marL="0" marR="0" lvl="0" indent="0" algn="ctr" defTabSz="914269" rtl="0" eaLnBrk="1" fontAlgn="auto" latinLnBrk="0" hangingPunct="1">
+                        <a:lnSpc>
+                          <a:spcPct val="100000"/>
+                        </a:lnSpc>
+                        <a:spcBef>
+                          <a:spcPts val="0"/>
+                        </a:spcBef>
+                        <a:spcAft>
+                          <a:spcPts val="0"/>
+                        </a:spcAft>
+                        <a:buClrTx/>
+                        <a:buSzTx/>
+                        <a:buFontTx/>
+                        <a:buNone/>
+                        <a:tabLst/>
+                        <a:defRPr/>
+                      </a:pPr>
+                      <a:r>
+                        <a:rPr kumimoji="0" lang="en-US" sz="1200" b="1" i="0" u="none" strike="noStrike" kern="1200" cap="none" spc="0" normalizeH="0" baseline="0" noProof="0" dirty="0">
+                          <a:ln>
+                            <a:noFill/>
+                          </a:ln>
+                          <a:solidFill>
+                            <a:prstClr val="white"/>
+                          </a:solidFill>
+                          <a:effectLst/>
+                          <a:uLnTx/>
+                          <a:uFillTx/>
+                          <a:latin typeface="+mn-lt"/>
+                          <a:ea typeface="+mn-ea"/>
+                          <a:cs typeface="+mn-cs"/>
+                        </a:rPr>
+                        <a:t>U3</a:t>
+                      </a:r>
+                      <a:endParaRPr kumimoji="0" lang="en-IN" sz="1200" b="1" i="0" u="none" strike="noStrike" kern="1200" cap="none" spc="0" normalizeH="0" baseline="0" noProof="0" dirty="0">
+                        <a:ln>
+                          <a:noFill/>
+                        </a:ln>
+                        <a:solidFill>
+                          <a:prstClr val="white"/>
+                        </a:solidFill>
+                        <a:effectLst/>
+                        <a:uLnTx/>
+                        <a:uFillTx/>
+                        <a:latin typeface="+mn-lt"/>
+                        <a:ea typeface="+mn-ea"/>
+                        <a:cs typeface="+mn-cs"/>
+                      </a:endParaRPr>
+                    </a:p>
+                  </a:txBody>
+                  <a:tcPr anchor="ctr">
+                    <a:solidFill>
+                      <a:srgbClr val="FF0000"/>
+                    </a:solidFill>
+                  </a:tcPr>
+                </a:tc>
+                <a:tc>
+                  <a:txBody>
+                    <a:bodyPr/>
+                    <a:lstStyle/>
+                    <a:p>
+                      <a:pPr marL="0" marR="0" lvl="0" indent="0" algn="ctr" defTabSz="914269" rtl="0" eaLnBrk="1" fontAlgn="auto" latinLnBrk="0" hangingPunct="1">
+                        <a:lnSpc>
+                          <a:spcPct val="100000"/>
+                        </a:lnSpc>
+                        <a:spcBef>
+                          <a:spcPts val="0"/>
+                        </a:spcBef>
+                        <a:spcAft>
+                          <a:spcPts val="0"/>
+                        </a:spcAft>
+                        <a:buClrTx/>
+                        <a:buSzTx/>
+                        <a:buFontTx/>
+                        <a:buNone/>
+                        <a:tabLst/>
+                        <a:defRPr/>
+                      </a:pPr>
+                      <a:r>
+                        <a:rPr kumimoji="0" lang="en-US" sz="1200" b="1" i="0" u="none" strike="noStrike" kern="1200" cap="none" spc="0" normalizeH="0" baseline="0" noProof="0" dirty="0">
+                          <a:ln>
+                            <a:noFill/>
+                          </a:ln>
+                          <a:solidFill>
+                            <a:prstClr val="white"/>
+                          </a:solidFill>
+                          <a:effectLst/>
+                          <a:uLnTx/>
+                          <a:uFillTx/>
+                          <a:latin typeface="Open Sans"/>
+                          <a:ea typeface="+mn-ea"/>
+                          <a:cs typeface="+mn-cs"/>
+                        </a:rPr>
+                        <a:t>U6</a:t>
+                      </a:r>
+                      <a:endParaRPr kumimoji="0" lang="en-IN" sz="1200" b="1" i="0" u="none" strike="noStrike" kern="1200" cap="none" spc="0" normalizeH="0" baseline="0" noProof="0" dirty="0">
+                        <a:ln>
+                          <a:noFill/>
+                        </a:ln>
+                        <a:solidFill>
+                          <a:prstClr val="white"/>
+                        </a:solidFill>
+                        <a:effectLst/>
+                        <a:uLnTx/>
+                        <a:uFillTx/>
+                        <a:latin typeface="Open Sans"/>
+                        <a:ea typeface="+mn-ea"/>
+                        <a:cs typeface="+mn-cs"/>
+                      </a:endParaRPr>
+                    </a:p>
+                  </a:txBody>
+                  <a:tcPr anchor="ctr">
+                    <a:solidFill>
+                      <a:srgbClr val="FF0000"/>
+                    </a:solidFill>
+                  </a:tcPr>
+                </a:tc>
+                <a:tc>
+                  <a:txBody>
+                    <a:bodyPr/>
+                    <a:lstStyle/>
+                    <a:p>
+                      <a:pPr marL="0" marR="0" lvl="0" indent="0" algn="ctr" defTabSz="914269" rtl="0" eaLnBrk="1" fontAlgn="auto" latinLnBrk="0" hangingPunct="1">
+                        <a:lnSpc>
+                          <a:spcPct val="100000"/>
+                        </a:lnSpc>
+                        <a:spcBef>
+                          <a:spcPts val="0"/>
+                        </a:spcBef>
+                        <a:spcAft>
+                          <a:spcPts val="0"/>
+                        </a:spcAft>
+                        <a:buClrTx/>
+                        <a:buSzTx/>
+                        <a:buFontTx/>
+                        <a:buNone/>
+                        <a:tabLst/>
+                        <a:defRPr/>
+                      </a:pPr>
+                      <a:r>
+                        <a:rPr kumimoji="0" lang="en-US" sz="1200" b="1" i="0" u="none" strike="noStrike" kern="1200" cap="none" spc="0" normalizeH="0" baseline="0" noProof="0" dirty="0">
+                          <a:ln>
+                            <a:noFill/>
+                          </a:ln>
+                          <a:solidFill>
+                            <a:prstClr val="white"/>
+                          </a:solidFill>
+                          <a:effectLst/>
+                          <a:uLnTx/>
+                          <a:uFillTx/>
+                          <a:latin typeface="Open Sans"/>
+                          <a:ea typeface="+mn-ea"/>
+                          <a:cs typeface="+mn-cs"/>
+                        </a:rPr>
+                        <a:t>U9</a:t>
+                      </a:r>
+                      <a:endParaRPr kumimoji="0" lang="en-IN" sz="1200" b="1" i="0" u="none" strike="noStrike" kern="1200" cap="none" spc="0" normalizeH="0" baseline="0" noProof="0" dirty="0">
+                        <a:ln>
+                          <a:noFill/>
+                        </a:ln>
+                        <a:solidFill>
+                          <a:prstClr val="white"/>
+                        </a:solidFill>
+                        <a:effectLst/>
+                        <a:uLnTx/>
+                        <a:uFillTx/>
+                        <a:latin typeface="Open Sans"/>
+                        <a:ea typeface="+mn-ea"/>
+                        <a:cs typeface="+mn-cs"/>
+                      </a:endParaRPr>
+                    </a:p>
+                  </a:txBody>
+                  <a:tcPr anchor="ctr">
+                    <a:solidFill>
+                      <a:srgbClr val="FF0000"/>
+                    </a:solidFill>
+                  </a:tcPr>
+                </a:tc>
+                <a:extLst>
+                  <a:ext uri="{0D108BD9-81ED-4DB2-BD59-A6C34878D82A}">
+                    <a16:rowId xmlns:a16="http://schemas.microsoft.com/office/drawing/2014/main" val="1178865150"/>
+                  </a:ext>
+                </a:extLst>
+              </a:tr>
+            </a:tbl>
+          </a:graphicData>
+        </a:graphic>
+      </p:graphicFrame>
+      <p:pic>
+        <p:nvPicPr>
+          <p:cNvPr id="12" name="Picture 11">
+            <a:extLst>
+              <a:ext uri="{FF2B5EF4-FFF2-40B4-BE49-F238E27FC236}">
+                <a16:creationId xmlns:a16="http://schemas.microsoft.com/office/drawing/2014/main" id="{5ED1EC20-B5C8-AE3C-96B6-28F4B137CFBB}"/>
+              </a:ext>
+            </a:extLst>
+          </p:cNvPr>
+          <p:cNvPicPr>
+            <a:picLocks noChangeAspect="1"/>
+          </p:cNvPicPr>
+          <p:nvPr/>
+        </p:nvPicPr>
+        <p:blipFill>
+          <a:blip r:embed="rId5" cstate="print">
+            <a:extLst>
+              <a:ext uri="{28A0092B-C50C-407E-A947-70E740481C1C}">
+                <a14:useLocalDpi xmlns:a14="http://schemas.microsoft.com/office/drawing/2010/main" val="0"/>
+              </a:ext>
+            </a:extLst>
+          </a:blip>
+          <a:stretch>
+            <a:fillRect/>
+          </a:stretch>
+        </p:blipFill>
+        <p:spPr>
+          <a:xfrm>
+            <a:off x="8272737" y="2567022"/>
+            <a:ext cx="3395802" cy="2739673"/>
+          </a:xfrm>
+          <a:prstGeom prst="rect">
+            <a:avLst/>
+          </a:prstGeom>
+        </p:spPr>
+      </p:pic>
+      <p:graphicFrame>
+        <p:nvGraphicFramePr>
+          <p:cNvPr id="15" name="Table 14">
+            <a:extLst>
+              <a:ext uri="{FF2B5EF4-FFF2-40B4-BE49-F238E27FC236}">
+                <a16:creationId xmlns:a16="http://schemas.microsoft.com/office/drawing/2014/main" id="{4A36E539-C00C-C700-E0B8-2D6DBAAF297A}"/>
+              </a:ext>
+            </a:extLst>
+          </p:cNvPr>
+          <p:cNvGraphicFramePr>
+            <a:graphicFrameLocks noGrp="1"/>
+          </p:cNvGraphicFramePr>
+          <p:nvPr>
+            <p:extLst>
+              <p:ext uri="{D42A27DB-BD31-4B8C-83A1-F6EECF244321}">
+                <p14:modId xmlns:p14="http://schemas.microsoft.com/office/powerpoint/2010/main" val="3628102287"/>
+              </p:ext>
+            </p:extLst>
+          </p:nvPr>
+        </p:nvGraphicFramePr>
+        <p:xfrm>
+          <a:off x="7803433" y="1252330"/>
+          <a:ext cx="790713" cy="1112520"/>
+        </p:xfrm>
+        <a:graphic>
+          <a:graphicData uri="http://schemas.openxmlformats.org/drawingml/2006/table">
+            <a:tbl>
+              <a:tblPr firstRow="1" bandRow="1">
+                <a:tableStyleId>{5940675A-B579-460E-94D1-54222C63F5DA}</a:tableStyleId>
+              </a:tblPr>
+              <a:tblGrid>
+                <a:gridCol w="790713">
+                  <a:extLst>
+                    <a:ext uri="{9D8B030D-6E8A-4147-A177-3AD203B41FA5}">
+                      <a16:colId xmlns:a16="http://schemas.microsoft.com/office/drawing/2014/main" val="1280704287"/>
+                    </a:ext>
+                  </a:extLst>
+                </a:gridCol>
+              </a:tblGrid>
+              <a:tr h="370840">
+                <a:tc>
+                  <a:txBody>
+                    <a:bodyPr/>
+                    <a:lstStyle/>
+                    <a:p>
+                      <a:pPr algn="ctr"/>
+                      <a:r>
+                        <a:rPr lang="en-US" sz="1200" b="1" dirty="0">
+                          <a:solidFill>
+                            <a:schemeClr val="bg2"/>
+                          </a:solidFill>
+                        </a:rPr>
+                        <a:t>x=0.1</a:t>
+                      </a:r>
+                      <a:endParaRPr lang="en-IN" sz="1200" b="1" dirty="0">
+                        <a:solidFill>
+                          <a:schemeClr val="bg2"/>
+                        </a:solidFill>
+                      </a:endParaRPr>
+                    </a:p>
+                  </a:txBody>
+                  <a:tcPr anchor="ctr">
+                    <a:solidFill>
+                      <a:schemeClr val="accent4"/>
+                    </a:solidFill>
+                  </a:tcPr>
+                </a:tc>
+                <a:extLst>
+                  <a:ext uri="{0D108BD9-81ED-4DB2-BD59-A6C34878D82A}">
+                    <a16:rowId xmlns:a16="http://schemas.microsoft.com/office/drawing/2014/main" val="4069275214"/>
+                  </a:ext>
+                </a:extLst>
+              </a:tr>
+              <a:tr h="370840">
+                <a:tc>
+                  <a:txBody>
+                    <a:bodyPr/>
+                    <a:lstStyle/>
+                    <a:p>
+                      <a:pPr algn="ctr"/>
+                      <a:r>
+                        <a:rPr lang="en-US" sz="1200" b="1" dirty="0">
+                          <a:solidFill>
+                            <a:schemeClr val="bg2"/>
+                          </a:solidFill>
+                        </a:rPr>
+                        <a:t>x=0.192</a:t>
+                      </a:r>
+                      <a:endParaRPr lang="en-IN" sz="1200" b="1" dirty="0">
+                        <a:solidFill>
+                          <a:schemeClr val="bg2"/>
+                        </a:solidFill>
+                      </a:endParaRPr>
+                    </a:p>
+                  </a:txBody>
+                  <a:tcPr anchor="ctr">
+                    <a:solidFill>
+                      <a:srgbClr val="FFC000"/>
+                    </a:solidFill>
+                  </a:tcPr>
+                </a:tc>
+                <a:extLst>
+                  <a:ext uri="{0D108BD9-81ED-4DB2-BD59-A6C34878D82A}">
+                    <a16:rowId xmlns:a16="http://schemas.microsoft.com/office/drawing/2014/main" val="2309651397"/>
+                  </a:ext>
+                </a:extLst>
+              </a:tr>
+              <a:tr h="370840">
+                <a:tc>
+                  <a:txBody>
+                    <a:bodyPr/>
+                    <a:lstStyle/>
+                    <a:p>
+                      <a:pPr algn="ctr"/>
+                      <a:r>
+                        <a:rPr lang="en-US" sz="1200" b="1" dirty="0">
+                          <a:solidFill>
+                            <a:schemeClr val="bg2"/>
+                          </a:solidFill>
+                        </a:rPr>
+                        <a:t>x=0.284</a:t>
+                      </a:r>
+                      <a:endParaRPr lang="en-IN" sz="1200" b="1" dirty="0">
+                        <a:solidFill>
+                          <a:schemeClr val="bg2"/>
+                        </a:solidFill>
+                      </a:endParaRPr>
+                    </a:p>
+                  </a:txBody>
+                  <a:tcPr anchor="ctr">
+                    <a:solidFill>
+                      <a:srgbClr val="FF0000"/>
+                    </a:solidFill>
+                  </a:tcPr>
+                </a:tc>
+                <a:extLst>
+                  <a:ext uri="{0D108BD9-81ED-4DB2-BD59-A6C34878D82A}">
+                    <a16:rowId xmlns:a16="http://schemas.microsoft.com/office/drawing/2014/main" val="1586476481"/>
+                  </a:ext>
+                </a:extLst>
+              </a:tr>
+            </a:tbl>
+          </a:graphicData>
+        </a:graphic>
+      </p:graphicFrame>
+      <p:sp>
+        <p:nvSpPr>
+          <p:cNvPr id="16" name="TextBox 15">
+            <a:extLst>
+              <a:ext uri="{FF2B5EF4-FFF2-40B4-BE49-F238E27FC236}">
+                <a16:creationId xmlns:a16="http://schemas.microsoft.com/office/drawing/2014/main" id="{CA518DA7-9EF6-9C00-9DE8-4A75C008736D}"/>
+              </a:ext>
+            </a:extLst>
+          </p:cNvPr>
+          <p:cNvSpPr txBox="1"/>
+          <p:nvPr/>
+        </p:nvSpPr>
+        <p:spPr>
+          <a:xfrm>
+            <a:off x="874711" y="5641724"/>
+            <a:ext cx="3657531" cy="341632"/>
+          </a:xfrm>
+          <a:prstGeom prst="rect">
+            <a:avLst/>
+          </a:prstGeom>
+          <a:noFill/>
+        </p:spPr>
+        <p:txBody>
+          <a:bodyPr wrap="square" rtlCol="0">
+            <a:spAutoFit/>
+          </a:bodyPr>
+          <a:lstStyle/>
+          <a:p>
+            <a:r>
+              <a:rPr lang="en-US" sz="1600" b="1" dirty="0">
+                <a:solidFill>
+                  <a:schemeClr val="accent1"/>
+                </a:solidFill>
+                <a:latin typeface="+mj-lt"/>
+                <a:ea typeface="+mj-ea"/>
+                <a:cs typeface="+mj-cs"/>
+              </a:rPr>
+              <a:t>Note: </a:t>
+            </a:r>
+            <a:r>
+              <a:rPr lang="en-US" sz="1600" dirty="0">
+                <a:solidFill>
+                  <a:schemeClr val="accent1"/>
+                </a:solidFill>
+                <a:latin typeface="+mj-lt"/>
+                <a:ea typeface="+mj-ea"/>
+                <a:cs typeface="+mj-cs"/>
+              </a:rPr>
+              <a:t>Cgs name used for </a:t>
+            </a:r>
+            <a:r>
+              <a:rPr lang="en-US" sz="1600" dirty="0" err="1">
+                <a:solidFill>
+                  <a:schemeClr val="accent1"/>
+                </a:solidFill>
+                <a:latin typeface="+mj-lt"/>
+                <a:ea typeface="+mj-ea"/>
+                <a:cs typeface="+mj-cs"/>
+              </a:rPr>
+              <a:t>Cgb</a:t>
+            </a:r>
+            <a:r>
+              <a:rPr lang="en-US" sz="1600" dirty="0">
+                <a:solidFill>
+                  <a:schemeClr val="accent1"/>
+                </a:solidFill>
+                <a:latin typeface="+mj-lt"/>
+                <a:ea typeface="+mj-ea"/>
+                <a:cs typeface="+mj-cs"/>
+              </a:rPr>
+              <a:t> </a:t>
+            </a:r>
+            <a:endParaRPr lang="en-IN" sz="1600" dirty="0">
+              <a:solidFill>
+                <a:schemeClr val="accent1"/>
+              </a:solidFill>
+              <a:latin typeface="+mj-lt"/>
+              <a:ea typeface="+mj-ea"/>
+              <a:cs typeface="+mj-cs"/>
+            </a:endParaRPr>
+          </a:p>
+        </p:txBody>
+      </p:sp>
+      <p:sp>
+        <p:nvSpPr>
+          <p:cNvPr id="17" name="TextBox 16">
+            <a:extLst>
+              <a:ext uri="{FF2B5EF4-FFF2-40B4-BE49-F238E27FC236}">
+                <a16:creationId xmlns:a16="http://schemas.microsoft.com/office/drawing/2014/main" id="{24379D46-C543-5453-EA71-9B654A6DBA3C}"/>
+              </a:ext>
+            </a:extLst>
+          </p:cNvPr>
+          <p:cNvSpPr txBox="1"/>
+          <p:nvPr/>
+        </p:nvSpPr>
+        <p:spPr>
+          <a:xfrm>
+            <a:off x="4704589" y="5392425"/>
+            <a:ext cx="6963950" cy="834074"/>
+          </a:xfrm>
+          <a:prstGeom prst="rect">
+            <a:avLst/>
+          </a:prstGeom>
+          <a:noFill/>
+        </p:spPr>
+        <p:txBody>
+          <a:bodyPr wrap="square" rtlCol="0">
+            <a:spAutoFit/>
+          </a:bodyPr>
+          <a:lstStyle/>
+          <a:p>
+            <a:r>
+              <a:rPr lang="en-US" sz="1600" b="1" dirty="0">
+                <a:solidFill>
+                  <a:schemeClr val="accent1"/>
+                </a:solidFill>
+                <a:latin typeface="+mj-lt"/>
+                <a:ea typeface="+mj-ea"/>
+                <a:cs typeface="+mj-cs"/>
+              </a:rPr>
+              <a:t>Observation:</a:t>
+            </a:r>
+          </a:p>
+          <a:p>
+            <a:r>
+              <a:rPr lang="en-US" sz="1600" dirty="0">
+                <a:solidFill>
+                  <a:schemeClr val="accent1"/>
+                </a:solidFill>
+                <a:latin typeface="+mj-lt"/>
+                <a:ea typeface="+mj-ea"/>
+                <a:cs typeface="+mj-cs"/>
+              </a:rPr>
+              <a:t>Almost Identical response in both case when steady state reached.</a:t>
+            </a:r>
+            <a:br>
+              <a:rPr lang="en-US" sz="1600" dirty="0">
+                <a:solidFill>
+                  <a:schemeClr val="accent1"/>
+                </a:solidFill>
+                <a:latin typeface="+mj-lt"/>
+                <a:ea typeface="+mj-ea"/>
+                <a:cs typeface="+mj-cs"/>
+              </a:rPr>
+            </a:br>
+            <a:r>
+              <a:rPr lang="en-US" sz="1600" dirty="0">
+                <a:solidFill>
+                  <a:schemeClr val="accent1"/>
+                </a:solidFill>
+                <a:latin typeface="+mj-lt"/>
+                <a:ea typeface="+mj-ea"/>
+                <a:cs typeface="+mj-cs"/>
+              </a:rPr>
+              <a:t>Small difference observed at the start.</a:t>
+            </a:r>
+            <a:endParaRPr lang="en-IN" dirty="0"/>
+          </a:p>
+        </p:txBody>
+      </p:sp>
+      <p:sp>
+        <p:nvSpPr>
+          <p:cNvPr id="18" name="TextBox 17">
+            <a:extLst>
+              <a:ext uri="{FF2B5EF4-FFF2-40B4-BE49-F238E27FC236}">
+                <a16:creationId xmlns:a16="http://schemas.microsoft.com/office/drawing/2014/main" id="{FD7ED878-4FA9-4102-1529-A4F52EB4BE61}"/>
+              </a:ext>
+            </a:extLst>
+          </p:cNvPr>
+          <p:cNvSpPr txBox="1"/>
+          <p:nvPr/>
+        </p:nvSpPr>
+        <p:spPr>
+          <a:xfrm>
+            <a:off x="5095493" y="805098"/>
+            <a:ext cx="2613991" cy="341632"/>
+          </a:xfrm>
+          <a:prstGeom prst="rect">
+            <a:avLst/>
+          </a:prstGeom>
+          <a:noFill/>
+        </p:spPr>
+        <p:txBody>
+          <a:bodyPr wrap="square" rtlCol="0">
+            <a:spAutoFit/>
+          </a:bodyPr>
+          <a:lstStyle/>
+          <a:p>
+            <a:pPr algn="ctr"/>
+            <a:r>
+              <a:rPr lang="en-US" b="1" dirty="0">
+                <a:solidFill>
+                  <a:srgbClr val="DE2526"/>
+                </a:solidFill>
+              </a:rPr>
+              <a:t>COL</a:t>
+            </a:r>
+            <a:endParaRPr lang="en-IN" b="1" dirty="0">
+              <a:solidFill>
+                <a:srgbClr val="DE2526"/>
+              </a:solidFill>
+            </a:endParaRPr>
+          </a:p>
+        </p:txBody>
+      </p:sp>
+      <p:sp>
+        <p:nvSpPr>
+          <p:cNvPr id="19" name="TextBox 18">
+            <a:extLst>
+              <a:ext uri="{FF2B5EF4-FFF2-40B4-BE49-F238E27FC236}">
+                <a16:creationId xmlns:a16="http://schemas.microsoft.com/office/drawing/2014/main" id="{59DD7736-243D-99CA-05C5-5EB6DAEB7C3A}"/>
+              </a:ext>
+            </a:extLst>
+          </p:cNvPr>
+          <p:cNvSpPr txBox="1"/>
+          <p:nvPr/>
+        </p:nvSpPr>
+        <p:spPr>
+          <a:xfrm>
+            <a:off x="8717776" y="805106"/>
+            <a:ext cx="2613991" cy="341632"/>
+          </a:xfrm>
+          <a:prstGeom prst="rect">
+            <a:avLst/>
+          </a:prstGeom>
+          <a:noFill/>
+        </p:spPr>
+        <p:txBody>
+          <a:bodyPr wrap="square" rtlCol="0">
+            <a:spAutoFit/>
+          </a:bodyPr>
+          <a:lstStyle/>
+          <a:p>
+            <a:pPr algn="ctr"/>
+            <a:r>
+              <a:rPr lang="en-US" b="1" dirty="0">
+                <a:solidFill>
+                  <a:srgbClr val="DE2526"/>
+                </a:solidFill>
+              </a:rPr>
+              <a:t>ROW</a:t>
+            </a:r>
+            <a:endParaRPr lang="en-IN" b="1" dirty="0">
+              <a:solidFill>
+                <a:srgbClr val="DE2526"/>
+              </a:solidFill>
+            </a:endParaRPr>
+          </a:p>
+        </p:txBody>
+      </p:sp>
+    </p:spTree>
+    <p:custDataLst>
+      <p:tags r:id="rId1"/>
+    </p:custDataLst>
+    <p:extLst>
+      <p:ext uri="{BB962C8B-B14F-4D97-AF65-F5344CB8AC3E}">
+        <p14:creationId xmlns:p14="http://schemas.microsoft.com/office/powerpoint/2010/main" val="1619260384"/>
+      </p:ext>
+    </p:extLst>
+  </p:cSld>
+  <p:clrMapOvr>
+    <a:masterClrMapping/>
+  </p:clrMapOvr>
+</p:sld>
+</file>
+
+<file path=ppt/slides/slide9.xml><?xml version="1.0" encoding="utf-8"?>
+<p:sld xmlns:a="http://schemas.openxmlformats.org/drawingml/2006/main" xmlns:r="http://schemas.openxmlformats.org/officeDocument/2006/relationships" xmlns:p="http://schemas.openxmlformats.org/presentationml/2006/main">
+  <p:cSld>
+    <p:spTree>
+      <p:nvGrpSpPr>
+        <p:cNvPr id="1" name=""/>
+        <p:cNvGrpSpPr/>
+        <p:nvPr/>
+      </p:nvGrpSpPr>
+      <p:grpSpPr>
+        <a:xfrm>
+          <a:off x="0" y="0"/>
+          <a:ext cx="0" cy="0"/>
+          <a:chOff x="0" y="0"/>
+          <a:chExt cx="0" cy="0"/>
+        </a:xfrm>
+      </p:grpSpPr>
+      <p:sp>
+        <p:nvSpPr>
+          <p:cNvPr id="3" name="Titel 2"/>
+          <p:cNvSpPr>
+            <a:spLocks noGrp="1"/>
+          </p:cNvSpPr>
+          <p:nvPr>
+            <p:ph type="title"/>
+          </p:nvPr>
+        </p:nvSpPr>
+        <p:spPr/>
+        <p:txBody>
+          <a:bodyPr/>
+          <a:lstStyle/>
+          <a:p>
+            <a:r>
+              <a:rPr lang="en-US" dirty="0"/>
+              <a:t>Spiking Neural Network</a:t>
+            </a:r>
+            <a:br>
+              <a:rPr lang="en-US" dirty="0"/>
+            </a:br>
+            <a:br>
+              <a:rPr lang="en-US" dirty="0"/>
+            </a:br>
+            <a:endParaRPr lang="en-US" b="0" dirty="0"/>
+          </a:p>
+        </p:txBody>
+      </p:sp>
+      <p:pic>
+        <p:nvPicPr>
+          <p:cNvPr id="7" name="Picture 6">
+            <a:extLst>
+              <a:ext uri="{FF2B5EF4-FFF2-40B4-BE49-F238E27FC236}">
+                <a16:creationId xmlns:a16="http://schemas.microsoft.com/office/drawing/2014/main" id="{EFBF15F5-186D-2F58-C3D0-D41C8C682555}"/>
+              </a:ext>
+            </a:extLst>
+          </p:cNvPr>
+          <p:cNvPicPr>
+            <a:picLocks noChangeAspect="1"/>
+          </p:cNvPicPr>
+          <p:nvPr/>
+        </p:nvPicPr>
+        <p:blipFill>
+          <a:blip r:embed="rId3"/>
+          <a:stretch>
+            <a:fillRect/>
+          </a:stretch>
+        </p:blipFill>
+        <p:spPr>
+          <a:xfrm>
+            <a:off x="874712" y="1028700"/>
+            <a:ext cx="4144549" cy="4552122"/>
+          </a:xfrm>
+          <a:prstGeom prst="rect">
+            <a:avLst/>
+          </a:prstGeom>
+        </p:spPr>
+      </p:pic>
     </p:spTree>
     <p:custDataLst>
       <p:tags r:id="rId1"/>
@@ -12577,6 +16957,24 @@
 </file>
 
 <file path=ppt/tags/tag5.xml><?xml version="1.0" encoding="utf-8"?>
+<p:tagLst xmlns:a="http://schemas.openxmlformats.org/drawingml/2006/main" xmlns:r="http://schemas.openxmlformats.org/officeDocument/2006/relationships" xmlns:p="http://schemas.openxmlformats.org/presentationml/2006/main">
+  <p:tag name="TIMING" val="|33.2|17"/>
+</p:tagLst>
+</file>
+
+<file path=ppt/tags/tag6.xml><?xml version="1.0" encoding="utf-8"?>
+<p:tagLst xmlns:a="http://schemas.openxmlformats.org/drawingml/2006/main" xmlns:r="http://schemas.openxmlformats.org/officeDocument/2006/relationships" xmlns:p="http://schemas.openxmlformats.org/presentationml/2006/main">
+  <p:tag name="TIMING" val="|33.2|17"/>
+</p:tagLst>
+</file>
+
+<file path=ppt/tags/tag7.xml><?xml version="1.0" encoding="utf-8"?>
+<p:tagLst xmlns:a="http://schemas.openxmlformats.org/drawingml/2006/main" xmlns:r="http://schemas.openxmlformats.org/officeDocument/2006/relationships" xmlns:p="http://schemas.openxmlformats.org/presentationml/2006/main">
+  <p:tag name="TIMING" val="|33.2|17"/>
+</p:tagLst>
+</file>
+
+<file path=ppt/tags/tag8.xml><?xml version="1.0" encoding="utf-8"?>
 <p:tagLst xmlns:a="http://schemas.openxmlformats.org/drawingml/2006/main" xmlns:r="http://schemas.openxmlformats.org/officeDocument/2006/relationships" xmlns:p="http://schemas.openxmlformats.org/presentationml/2006/main">
   <p:tag name="TIMING" val="|33.2|17"/>
 </p:tagLst>

</xml_diff>